<commit_message>
Commit date : 31 May 2017
</commit_message>
<xml_diff>
--- a/Presentations/ARM_PPTs/Ch2_ARMv8_Architecture.pptx
+++ b/Presentations/ARM_PPTs/Ch2_ARMv8_Architecture.pptx
@@ -7,8 +7,9 @@
   <p:sldIdLst>
     <p:sldId id="256" r:id="rId2"/>
     <p:sldId id="262" r:id="rId3"/>
-    <p:sldId id="263" r:id="rId4"/>
-    <p:sldId id="264" r:id="rId5"/>
+    <p:sldId id="265" r:id="rId4"/>
+    <p:sldId id="263" r:id="rId5"/>
+    <p:sldId id="264" r:id="rId6"/>
   </p:sldIdLst>
   <p:sldSz cx="12192000" cy="6858000"/>
   <p:notesSz cx="6858000" cy="9144000"/>
@@ -5903,12 +5904,639 @@
               <a:rPr lang="en-US" b="1" dirty="0">
                 <a:latin typeface="Arial-BoldMT"/>
               </a:rPr>
-              <a:t>Core Architecture of ARMv8</a:t>
-            </a:r>
-            <a:endParaRPr lang="en-US" dirty="0"/>
-          </a:p>
-        </p:txBody>
-      </p:sp>
+              <a:t>ARM Architecture History v1 ~~ v7</a:t>
+            </a:r>
+            <a:endParaRPr lang="en-US" dirty="0"/>
+          </a:p>
+        </p:txBody>
+      </p:sp>
+      <p:sp>
+        <p:nvSpPr>
+          <p:cNvPr id="2" name="Rectangle 1"/>
+          <p:cNvSpPr/>
+          <p:nvPr/>
+        </p:nvSpPr>
+        <p:spPr>
+          <a:xfrm>
+            <a:off x="265286" y="848458"/>
+            <a:ext cx="3640740" cy="369332"/>
+          </a:xfrm>
+          <a:prstGeom prst="rect">
+            <a:avLst/>
+          </a:prstGeom>
+        </p:spPr>
+        <p:txBody>
+          <a:bodyPr wrap="none">
+            <a:spAutoFit/>
+          </a:bodyPr>
+          <a:lstStyle/>
+          <a:p>
+            <a:r>
+              <a:rPr lang="en-US" dirty="0">
+                <a:latin typeface="TimesNewRomanPSMT"/>
+              </a:rPr>
+              <a:t>ARM architecture dates back to 1985</a:t>
+            </a:r>
+            <a:endParaRPr lang="en-US" dirty="0"/>
+          </a:p>
+        </p:txBody>
+      </p:sp>
+      <p:graphicFrame>
+        <p:nvGraphicFramePr>
+          <p:cNvPr id="3" name="Table 2"/>
+          <p:cNvGraphicFramePr>
+            <a:graphicFrameLocks noGrp="1"/>
+          </p:cNvGraphicFramePr>
+          <p:nvPr>
+            <p:extLst>
+              <p:ext uri="{D42A27DB-BD31-4B8C-83A1-F6EECF244321}">
+                <p14:modId xmlns:p14="http://schemas.microsoft.com/office/powerpoint/2010/main" val="2581035974"/>
+              </p:ext>
+            </p:extLst>
+          </p:nvPr>
+        </p:nvGraphicFramePr>
+        <p:xfrm>
+          <a:off x="265286" y="1380420"/>
+          <a:ext cx="8674808" cy="4739026"/>
+        </p:xfrm>
+        <a:graphic>
+          <a:graphicData uri="http://schemas.openxmlformats.org/drawingml/2006/table">
+            <a:tbl>
+              <a:tblPr firstRow="1" bandRow="1">
+                <a:tableStyleId>{5C22544A-7EE6-4342-B048-85BDC9FD1C3A}</a:tableStyleId>
+              </a:tblPr>
+              <a:tblGrid>
+                <a:gridCol w="2164244">
+                  <a:extLst>
+                    <a:ext uri="{9D8B030D-6E8A-4147-A177-3AD203B41FA5}">
+                      <a16:colId xmlns:a16="http://schemas.microsoft.com/office/drawing/2014/main" val="980716745"/>
+                    </a:ext>
+                  </a:extLst>
+                </a:gridCol>
+                <a:gridCol w="6510564">
+                  <a:extLst>
+                    <a:ext uri="{9D8B030D-6E8A-4147-A177-3AD203B41FA5}">
+                      <a16:colId xmlns:a16="http://schemas.microsoft.com/office/drawing/2014/main" val="2709679335"/>
+                    </a:ext>
+                  </a:extLst>
+                </a:gridCol>
+              </a:tblGrid>
+              <a:tr h="346289">
+                <a:tc>
+                  <a:txBody>
+                    <a:bodyPr/>
+                    <a:lstStyle/>
+                    <a:p>
+                      <a:r>
+                        <a:rPr lang="en-US" sz="1200" dirty="0"/>
+                        <a:t>ARM Version</a:t>
+                      </a:r>
+                    </a:p>
+                  </a:txBody>
+                  <a:tcPr/>
+                </a:tc>
+                <a:tc>
+                  <a:txBody>
+                    <a:bodyPr/>
+                    <a:lstStyle/>
+                    <a:p>
+                      <a:r>
+                        <a:rPr lang="en-US" sz="1200" dirty="0"/>
+                        <a:t>Features</a:t>
+                      </a:r>
+                    </a:p>
+                  </a:txBody>
+                  <a:tcPr/>
+                </a:tc>
+                <a:extLst>
+                  <a:ext uri="{0D108BD9-81ED-4DB2-BD59-A6C34878D82A}">
+                    <a16:rowId xmlns:a16="http://schemas.microsoft.com/office/drawing/2014/main" val="1564612189"/>
+                  </a:ext>
+                </a:extLst>
+              </a:tr>
+              <a:tr h="468131">
+                <a:tc>
+                  <a:txBody>
+                    <a:bodyPr/>
+                    <a:lstStyle/>
+                    <a:p>
+                      <a:r>
+                        <a:rPr lang="en-US" sz="1400" b="1" i="0" u="none" strike="noStrike" kern="1200" baseline="0" dirty="0">
+                          <a:solidFill>
+                            <a:schemeClr val="dk1"/>
+                          </a:solidFill>
+                          <a:latin typeface="Corbel" panose="020B0503020204020204" pitchFamily="34" charset="0"/>
+                          <a:ea typeface="+mn-ea"/>
+                          <a:cs typeface="+mn-cs"/>
+                        </a:rPr>
+                        <a:t>ARMv4 and earlier</a:t>
+                      </a:r>
+                      <a:endParaRPr lang="en-US" sz="1400" dirty="0">
+                        <a:latin typeface="Corbel" panose="020B0503020204020204" pitchFamily="34" charset="0"/>
+                      </a:endParaRPr>
+                    </a:p>
+                  </a:txBody>
+                  <a:tcPr/>
+                </a:tc>
+                <a:tc>
+                  <a:txBody>
+                    <a:bodyPr/>
+                    <a:lstStyle/>
+                    <a:p>
+                      <a:pPr marL="171450" indent="-171450">
+                        <a:buFont typeface="Arial" panose="020B0604020202020204" pitchFamily="34" charset="0"/>
+                        <a:buChar char="•"/>
+                      </a:pPr>
+                      <a:r>
+                        <a:rPr lang="en-US" sz="1200" b="0" i="0" u="none" strike="noStrike" kern="1200" baseline="0" dirty="0">
+                          <a:solidFill>
+                            <a:schemeClr val="dk1"/>
+                          </a:solidFill>
+                          <a:latin typeface="Corbel" panose="020B0503020204020204" pitchFamily="34" charset="0"/>
+                          <a:ea typeface="+mn-ea"/>
+                          <a:cs typeface="+mn-cs"/>
+                        </a:rPr>
+                        <a:t>Used only the ARM 32-bit instruction set</a:t>
+                      </a:r>
+                    </a:p>
+                  </a:txBody>
+                  <a:tcPr/>
+                </a:tc>
+                <a:extLst>
+                  <a:ext uri="{0D108BD9-81ED-4DB2-BD59-A6C34878D82A}">
+                    <a16:rowId xmlns:a16="http://schemas.microsoft.com/office/drawing/2014/main" val="532419933"/>
+                  </a:ext>
+                </a:extLst>
+              </a:tr>
+              <a:tr h="500195">
+                <a:tc>
+                  <a:txBody>
+                    <a:bodyPr/>
+                    <a:lstStyle/>
+                    <a:p>
+                      <a:r>
+                        <a:rPr lang="en-US" sz="1400" b="1" i="0" u="none" strike="noStrike" kern="1200" baseline="0" dirty="0">
+                          <a:solidFill>
+                            <a:schemeClr val="dk1"/>
+                          </a:solidFill>
+                          <a:latin typeface="Corbel" panose="020B0503020204020204" pitchFamily="34" charset="0"/>
+                          <a:ea typeface="+mn-ea"/>
+                          <a:cs typeface="+mn-cs"/>
+                        </a:rPr>
+                        <a:t>ARMv4T</a:t>
+                      </a:r>
+                      <a:endParaRPr lang="en-US" sz="1400" dirty="0">
+                        <a:latin typeface="Corbel" panose="020B0503020204020204" pitchFamily="34" charset="0"/>
+                      </a:endParaRPr>
+                    </a:p>
+                  </a:txBody>
+                  <a:tcPr/>
+                </a:tc>
+                <a:tc>
+                  <a:txBody>
+                    <a:bodyPr/>
+                    <a:lstStyle/>
+                    <a:p>
+                      <a:pPr marL="171450" indent="-171450">
+                        <a:buFont typeface="Arial" panose="020B0604020202020204" pitchFamily="34" charset="0"/>
+                        <a:buChar char="•"/>
+                      </a:pPr>
+                      <a:r>
+                        <a:rPr lang="en-US" sz="1200" b="0" i="0" u="none" strike="noStrike" kern="1200" baseline="0" dirty="0">
+                          <a:solidFill>
+                            <a:schemeClr val="dk1"/>
+                          </a:solidFill>
+                          <a:latin typeface="Corbel" panose="020B0503020204020204" pitchFamily="34" charset="0"/>
+                          <a:ea typeface="+mn-ea"/>
+                          <a:cs typeface="+mn-cs"/>
+                        </a:rPr>
+                        <a:t>Added Thumb 16-bit instruction </a:t>
+                      </a:r>
+                    </a:p>
+                    <a:p>
+                      <a:pPr marL="171450" indent="-171450">
+                        <a:buFont typeface="Arial" panose="020B0604020202020204" pitchFamily="34" charset="0"/>
+                        <a:buChar char="•"/>
+                      </a:pPr>
+                      <a:r>
+                        <a:rPr lang="en-US" sz="1200" b="0" i="0" u="none" strike="noStrike" kern="1200" baseline="0" dirty="0">
+                          <a:solidFill>
+                            <a:schemeClr val="dk1"/>
+                          </a:solidFill>
+                          <a:latin typeface="Corbel" panose="020B0503020204020204" pitchFamily="34" charset="0"/>
+                          <a:ea typeface="+mn-ea"/>
+                          <a:cs typeface="+mn-cs"/>
+                        </a:rPr>
+                        <a:t>(e.g. ARM7TDMI® , ARM9TDMI® processors)</a:t>
+                      </a:r>
+                    </a:p>
+                  </a:txBody>
+                  <a:tcPr/>
+                </a:tc>
+                <a:extLst>
+                  <a:ext uri="{0D108BD9-81ED-4DB2-BD59-A6C34878D82A}">
+                    <a16:rowId xmlns:a16="http://schemas.microsoft.com/office/drawing/2014/main" val="1981400242"/>
+                  </a:ext>
+                </a:extLst>
+              </a:tr>
+              <a:tr h="500195">
+                <a:tc>
+                  <a:txBody>
+                    <a:bodyPr/>
+                    <a:lstStyle/>
+                    <a:p>
+                      <a:r>
+                        <a:rPr lang="en-US" sz="1400" b="1" i="0" u="none" strike="noStrike" kern="1200" baseline="0" dirty="0">
+                          <a:solidFill>
+                            <a:schemeClr val="dk1"/>
+                          </a:solidFill>
+                          <a:latin typeface="Corbel" panose="020B0503020204020204" pitchFamily="34" charset="0"/>
+                          <a:ea typeface="+mn-ea"/>
+                          <a:cs typeface="+mn-cs"/>
+                        </a:rPr>
+                        <a:t>ARMv5TE</a:t>
+                      </a:r>
+                      <a:endParaRPr lang="en-US" sz="1400" dirty="0">
+                        <a:latin typeface="Corbel" panose="020B0503020204020204" pitchFamily="34" charset="0"/>
+                      </a:endParaRPr>
+                    </a:p>
+                  </a:txBody>
+                  <a:tcPr/>
+                </a:tc>
+                <a:tc>
+                  <a:txBody>
+                    <a:bodyPr/>
+                    <a:lstStyle/>
+                    <a:p>
+                      <a:pPr marL="171450" indent="-171450">
+                        <a:buFont typeface="Arial" panose="020B0604020202020204" pitchFamily="34" charset="0"/>
+                        <a:buChar char="•"/>
+                      </a:pPr>
+                      <a:r>
+                        <a:rPr lang="en-US" sz="1200" b="0" i="0" u="none" strike="noStrike" kern="1200" baseline="0" dirty="0">
+                          <a:solidFill>
+                            <a:schemeClr val="dk1"/>
+                          </a:solidFill>
+                          <a:latin typeface="Corbel" panose="020B0503020204020204" pitchFamily="34" charset="0"/>
+                          <a:ea typeface="+mn-ea"/>
+                          <a:cs typeface="+mn-cs"/>
+                        </a:rPr>
+                        <a:t>Added improvements for DSP-type operations,</a:t>
+                      </a:r>
+                    </a:p>
+                    <a:p>
+                      <a:r>
+                        <a:rPr lang="en-US" sz="1200" b="0" i="0" u="none" strike="noStrike" kern="1200" baseline="0" dirty="0">
+                          <a:solidFill>
+                            <a:schemeClr val="dk1"/>
+                          </a:solidFill>
+                          <a:latin typeface="Corbel" panose="020B0503020204020204" pitchFamily="34" charset="0"/>
+                          <a:ea typeface="+mn-ea"/>
+                          <a:cs typeface="+mn-cs"/>
+                        </a:rPr>
+                        <a:t>saturated arithmetic, and for ARM and Thumb interworking. (e.g. ARM926EJ-S®)</a:t>
+                      </a:r>
+                    </a:p>
+                  </a:txBody>
+                  <a:tcPr/>
+                </a:tc>
+                <a:extLst>
+                  <a:ext uri="{0D108BD9-81ED-4DB2-BD59-A6C34878D82A}">
+                    <a16:rowId xmlns:a16="http://schemas.microsoft.com/office/drawing/2014/main" val="3510247932"/>
+                  </a:ext>
+                </a:extLst>
+              </a:tr>
+              <a:tr h="1462108">
+                <a:tc>
+                  <a:txBody>
+                    <a:bodyPr/>
+                    <a:lstStyle/>
+                    <a:p>
+                      <a:r>
+                        <a:rPr lang="en-US" sz="1400" b="1" i="0" u="none" strike="noStrike" kern="1200" baseline="0" dirty="0">
+                          <a:solidFill>
+                            <a:schemeClr val="dk1"/>
+                          </a:solidFill>
+                          <a:latin typeface="Corbel" panose="020B0503020204020204" pitchFamily="34" charset="0"/>
+                          <a:ea typeface="+mn-ea"/>
+                          <a:cs typeface="+mn-cs"/>
+                        </a:rPr>
+                        <a:t>ARMv6</a:t>
+                      </a:r>
+                      <a:endParaRPr lang="en-US" sz="1400" dirty="0">
+                        <a:latin typeface="Corbel" panose="020B0503020204020204" pitchFamily="34" charset="0"/>
+                      </a:endParaRPr>
+                    </a:p>
+                  </a:txBody>
+                  <a:tcPr/>
+                </a:tc>
+                <a:tc>
+                  <a:txBody>
+                    <a:bodyPr/>
+                    <a:lstStyle/>
+                    <a:p>
+                      <a:pPr marL="171450" indent="-171450">
+                        <a:buFont typeface="Arial" panose="020B0604020202020204" pitchFamily="34" charset="0"/>
+                        <a:buChar char="•"/>
+                      </a:pPr>
+                      <a:r>
+                        <a:rPr lang="en-US" sz="1200" b="0" i="0" u="none" strike="noStrike" kern="1200" baseline="0" dirty="0">
+                          <a:solidFill>
+                            <a:schemeClr val="dk1"/>
+                          </a:solidFill>
+                          <a:latin typeface="Corbel" panose="020B0503020204020204" pitchFamily="34" charset="0"/>
+                          <a:ea typeface="+mn-ea"/>
+                          <a:cs typeface="+mn-cs"/>
+                        </a:rPr>
+                        <a:t>Support for unaligned memory accesses</a:t>
+                      </a:r>
+                    </a:p>
+                    <a:p>
+                      <a:pPr marL="171450" indent="-171450">
+                        <a:buFont typeface="Arial" panose="020B0604020202020204" pitchFamily="34" charset="0"/>
+                        <a:buChar char="•"/>
+                      </a:pPr>
+                      <a:r>
+                        <a:rPr lang="en-US" sz="1200" b="0" i="0" u="none" strike="noStrike" kern="1200" baseline="0" dirty="0">
+                          <a:solidFill>
+                            <a:schemeClr val="dk1"/>
+                          </a:solidFill>
+                          <a:latin typeface="Corbel" panose="020B0503020204020204" pitchFamily="34" charset="0"/>
+                          <a:ea typeface="+mn-ea"/>
+                          <a:cs typeface="+mn-cs"/>
+                        </a:rPr>
+                        <a:t>Significant changes to the memory architecture </a:t>
+                      </a:r>
+                    </a:p>
+                    <a:p>
+                      <a:pPr marL="171450" indent="-171450">
+                        <a:buFont typeface="Arial" panose="020B0604020202020204" pitchFamily="34" charset="0"/>
+                        <a:buChar char="•"/>
+                      </a:pPr>
+                      <a:r>
+                        <a:rPr lang="en-US" sz="1200" b="0" i="0" u="none" strike="noStrike" kern="1200" baseline="0" dirty="0">
+                          <a:solidFill>
+                            <a:schemeClr val="dk1"/>
+                          </a:solidFill>
+                          <a:latin typeface="Corbel" panose="020B0503020204020204" pitchFamily="34" charset="0"/>
+                          <a:ea typeface="+mn-ea"/>
+                          <a:cs typeface="+mn-cs"/>
+                        </a:rPr>
+                        <a:t>Multi-processor support. (e.g. ARM1136JF-S®)</a:t>
+                      </a:r>
+                    </a:p>
+                    <a:p>
+                      <a:pPr marL="171450" indent="-171450">
+                        <a:buFont typeface="Arial" panose="020B0604020202020204" pitchFamily="34" charset="0"/>
+                        <a:buChar char="•"/>
+                      </a:pPr>
+                      <a:r>
+                        <a:rPr lang="en-US" sz="1200" b="0" i="0" u="none" strike="noStrike" kern="1200" baseline="0" dirty="0">
+                          <a:solidFill>
+                            <a:schemeClr val="dk1"/>
+                          </a:solidFill>
+                          <a:latin typeface="Corbel" panose="020B0503020204020204" pitchFamily="34" charset="0"/>
+                          <a:ea typeface="+mn-ea"/>
+                          <a:cs typeface="+mn-cs"/>
+                        </a:rPr>
+                        <a:t>Support for SIMD operations.</a:t>
+                      </a:r>
+                    </a:p>
+                    <a:p>
+                      <a:pPr marL="285750" indent="-285750">
+                        <a:buFont typeface="Arial" panose="020B0604020202020204" pitchFamily="34" charset="0"/>
+                        <a:buChar char="•"/>
+                      </a:pPr>
+                      <a:endParaRPr lang="en-US" sz="1200" b="0" i="0" u="none" strike="noStrike" kern="1200" baseline="0" dirty="0">
+                        <a:solidFill>
+                          <a:schemeClr val="dk1"/>
+                        </a:solidFill>
+                        <a:latin typeface="Corbel" panose="020B0503020204020204" pitchFamily="34" charset="0"/>
+                        <a:ea typeface="+mn-ea"/>
+                        <a:cs typeface="+mn-cs"/>
+                      </a:endParaRPr>
+                    </a:p>
+                    <a:p>
+                      <a:pPr marL="285750" indent="-285750">
+                        <a:buFont typeface="Arial" panose="020B0604020202020204" pitchFamily="34" charset="0"/>
+                        <a:buChar char="•"/>
+                      </a:pPr>
+                      <a:r>
+                        <a:rPr lang="en-US" sz="1200" b="0" i="0" u="none" strike="noStrike" kern="1200" baseline="0" dirty="0">
+                          <a:solidFill>
+                            <a:schemeClr val="dk1"/>
+                          </a:solidFill>
+                          <a:latin typeface="Corbel" panose="020B0503020204020204" pitchFamily="34" charset="0"/>
+                          <a:ea typeface="+mn-ea"/>
+                          <a:cs typeface="+mn-cs"/>
+                        </a:rPr>
+                        <a:t>Some optional extensions, notably Thumb-2 and Security Extensions (</a:t>
+                      </a:r>
+                      <a:r>
+                        <a:rPr lang="en-US" sz="1200" b="0" i="0" u="none" strike="noStrike" kern="1200" baseline="0" dirty="0" err="1">
+                          <a:solidFill>
+                            <a:schemeClr val="dk1"/>
+                          </a:solidFill>
+                          <a:latin typeface="Corbel" panose="020B0503020204020204" pitchFamily="34" charset="0"/>
+                          <a:ea typeface="+mn-ea"/>
+                          <a:cs typeface="+mn-cs"/>
+                        </a:rPr>
+                        <a:t>TrustZone</a:t>
+                      </a:r>
+                      <a:r>
+                        <a:rPr lang="en-US" sz="1200" b="0" i="0" u="none" strike="noStrike" kern="1200" baseline="0" dirty="0">
+                          <a:solidFill>
+                            <a:schemeClr val="dk1"/>
+                          </a:solidFill>
+                          <a:latin typeface="Corbel" panose="020B0503020204020204" pitchFamily="34" charset="0"/>
+                          <a:ea typeface="+mn-ea"/>
+                          <a:cs typeface="+mn-cs"/>
+                        </a:rPr>
+                        <a:t>®).</a:t>
+                      </a:r>
+                    </a:p>
+                    <a:p>
+                      <a:pPr marL="285750" indent="-285750">
+                        <a:buFont typeface="Arial" panose="020B0604020202020204" pitchFamily="34" charset="0"/>
+                        <a:buChar char="•"/>
+                      </a:pPr>
+                      <a:r>
+                        <a:rPr lang="en-US" sz="1200" b="0" i="0" u="none" strike="noStrike" kern="1200" baseline="0" dirty="0">
+                          <a:solidFill>
+                            <a:schemeClr val="dk1"/>
+                          </a:solidFill>
+                          <a:latin typeface="Corbel" panose="020B0503020204020204" pitchFamily="34" charset="0"/>
+                          <a:ea typeface="+mn-ea"/>
+                          <a:cs typeface="+mn-cs"/>
+                        </a:rPr>
+                        <a:t>Thumb-2 extends Thumb to be a mixed length 16-bit and 32-bit instruction set.</a:t>
+                      </a:r>
+                    </a:p>
+                  </a:txBody>
+                  <a:tcPr/>
+                </a:tc>
+                <a:extLst>
+                  <a:ext uri="{0D108BD9-81ED-4DB2-BD59-A6C34878D82A}">
+                    <a16:rowId xmlns:a16="http://schemas.microsoft.com/office/drawing/2014/main" val="2237110470"/>
+                  </a:ext>
+                </a:extLst>
+              </a:tr>
+              <a:tr h="1462108">
+                <a:tc>
+                  <a:txBody>
+                    <a:bodyPr/>
+                    <a:lstStyle/>
+                    <a:p>
+                      <a:r>
+                        <a:rPr lang="en-US" sz="1400" b="1" i="0" u="none" strike="noStrike" kern="1200" baseline="0" dirty="0">
+                          <a:solidFill>
+                            <a:schemeClr val="dk1"/>
+                          </a:solidFill>
+                          <a:latin typeface="Corbel" panose="020B0503020204020204" pitchFamily="34" charset="0"/>
+                          <a:ea typeface="+mn-ea"/>
+                          <a:cs typeface="+mn-cs"/>
+                        </a:rPr>
+                        <a:t>ARMv7-A</a:t>
+                      </a:r>
+                      <a:endParaRPr lang="en-US" sz="1400" dirty="0">
+                        <a:latin typeface="Corbel" panose="020B0503020204020204" pitchFamily="34" charset="0"/>
+                      </a:endParaRPr>
+                    </a:p>
+                  </a:txBody>
+                  <a:tcPr/>
+                </a:tc>
+                <a:tc>
+                  <a:txBody>
+                    <a:bodyPr/>
+                    <a:lstStyle/>
+                    <a:p>
+                      <a:pPr marL="285750" marR="0" lvl="0" indent="-285750" algn="l" defTabSz="457200" rtl="0" eaLnBrk="1" fontAlgn="auto" latinLnBrk="0" hangingPunct="1">
+                        <a:lnSpc>
+                          <a:spcPct val="100000"/>
+                        </a:lnSpc>
+                        <a:spcBef>
+                          <a:spcPts val="0"/>
+                        </a:spcBef>
+                        <a:spcAft>
+                          <a:spcPts val="0"/>
+                        </a:spcAft>
+                        <a:buClrTx/>
+                        <a:buSzTx/>
+                        <a:buFont typeface="Arial" panose="020B0604020202020204" pitchFamily="34" charset="0"/>
+                        <a:buChar char="•"/>
+                        <a:tabLst/>
+                        <a:defRPr/>
+                      </a:pPr>
+                      <a:r>
+                        <a:rPr lang="en-US" sz="1200" b="0" i="0" u="none" strike="noStrike" kern="1200" baseline="0" dirty="0">
+                          <a:solidFill>
+                            <a:schemeClr val="dk1"/>
+                          </a:solidFill>
+                          <a:latin typeface="Corbel" panose="020B0503020204020204" pitchFamily="34" charset="0"/>
+                          <a:ea typeface="+mn-ea"/>
+                          <a:cs typeface="+mn-cs"/>
+                        </a:rPr>
+                        <a:t>ARMv7-A makes Thumb-2 extensions mandatory</a:t>
+                      </a:r>
+                    </a:p>
+                    <a:p>
+                      <a:pPr marL="285750" indent="-285750">
+                        <a:buFont typeface="Arial" panose="020B0604020202020204" pitchFamily="34" charset="0"/>
+                        <a:buChar char="•"/>
+                      </a:pPr>
+                      <a:r>
+                        <a:rPr lang="en-US" sz="1200" b="0" i="0" u="none" strike="noStrike" kern="1200" baseline="0" dirty="0">
+                          <a:solidFill>
+                            <a:schemeClr val="dk1"/>
+                          </a:solidFill>
+                          <a:latin typeface="Corbel" panose="020B0503020204020204" pitchFamily="34" charset="0"/>
+                          <a:ea typeface="+mn-ea"/>
+                          <a:cs typeface="+mn-cs"/>
+                        </a:rPr>
+                        <a:t>Adds the Advanced SIMD extensions (NEON).</a:t>
+                      </a:r>
+                    </a:p>
+                    <a:p>
+                      <a:pPr marL="285750" indent="-285750">
+                        <a:buFont typeface="Arial" panose="020B0604020202020204" pitchFamily="34" charset="0"/>
+                        <a:buChar char="•"/>
+                      </a:pPr>
+                      <a:r>
+                        <a:rPr lang="en-US" sz="1200" b="0" i="0" u="none" strike="noStrike" kern="1200" baseline="0" dirty="0">
+                          <a:solidFill>
+                            <a:schemeClr val="dk1"/>
+                          </a:solidFill>
+                          <a:latin typeface="Corbel" panose="020B0503020204020204" pitchFamily="34" charset="0"/>
+                          <a:ea typeface="+mn-ea"/>
+                          <a:cs typeface="+mn-cs"/>
+                        </a:rPr>
+                        <a:t>ARM introduced a set of architecture profiles:</a:t>
+                      </a:r>
+                    </a:p>
+                    <a:p>
+                      <a:pPr marL="742950" lvl="1" indent="-285750">
+                        <a:buFont typeface="Arial" panose="020B0604020202020204" pitchFamily="34" charset="0"/>
+                        <a:buChar char="•"/>
+                      </a:pPr>
+                      <a:r>
+                        <a:rPr lang="en-US" sz="1200" b="0" i="0" u="none" strike="noStrike" kern="1200" baseline="0" dirty="0">
+                          <a:solidFill>
+                            <a:schemeClr val="dk1"/>
+                          </a:solidFill>
+                          <a:latin typeface="Corbel" panose="020B0503020204020204" pitchFamily="34" charset="0"/>
+                          <a:ea typeface="+mn-ea"/>
+                          <a:cs typeface="+mn-cs"/>
+                        </a:rPr>
+                        <a:t>ARMv7-A provides all the features necessary to support a platform Operating System such as Linux.</a:t>
+                      </a:r>
+                    </a:p>
+                    <a:p>
+                      <a:pPr marL="742950" lvl="1" indent="-285750">
+                        <a:buFont typeface="Arial" panose="020B0604020202020204" pitchFamily="34" charset="0"/>
+                        <a:buChar char="•"/>
+                      </a:pPr>
+                      <a:r>
+                        <a:rPr lang="en-US" sz="1200" b="0" i="0" u="none" strike="noStrike" kern="1200" baseline="0" dirty="0">
+                          <a:solidFill>
+                            <a:schemeClr val="dk1"/>
+                          </a:solidFill>
+                          <a:latin typeface="Corbel" panose="020B0503020204020204" pitchFamily="34" charset="0"/>
+                          <a:ea typeface="+mn-ea"/>
+                          <a:cs typeface="+mn-cs"/>
+                        </a:rPr>
+                        <a:t>ARMv7-R provides predictable real-time high-performance.</a:t>
+                      </a:r>
+                    </a:p>
+                    <a:p>
+                      <a:pPr marL="742950" lvl="1" indent="-285750">
+                        <a:buFont typeface="Arial" panose="020B0604020202020204" pitchFamily="34" charset="0"/>
+                        <a:buChar char="•"/>
+                      </a:pPr>
+                      <a:r>
+                        <a:rPr lang="en-US" sz="1200" b="0" i="0" u="none" strike="noStrike" kern="1200" baseline="0" dirty="0">
+                          <a:solidFill>
+                            <a:schemeClr val="dk1"/>
+                          </a:solidFill>
+                          <a:latin typeface="Corbel" panose="020B0503020204020204" pitchFamily="34" charset="0"/>
+                          <a:ea typeface="+mn-ea"/>
+                          <a:cs typeface="+mn-cs"/>
+                        </a:rPr>
+                        <a:t>ARMv7-M is targeted at deeply-embedded microcontrollers.</a:t>
+                      </a:r>
+                    </a:p>
+                  </a:txBody>
+                  <a:tcPr/>
+                </a:tc>
+                <a:extLst>
+                  <a:ext uri="{0D108BD9-81ED-4DB2-BD59-A6C34878D82A}">
+                    <a16:rowId xmlns:a16="http://schemas.microsoft.com/office/drawing/2014/main" val="1529253738"/>
+                  </a:ext>
+                </a:extLst>
+              </a:tr>
+            </a:tbl>
+          </a:graphicData>
+        </a:graphic>
+      </p:graphicFrame>
     </p:spTree>
     <p:extLst>
       <p:ext uri="{BB962C8B-B14F-4D97-AF65-F5344CB8AC3E}">
@@ -5964,7 +6592,412 @@
               <a:rPr lang="en-US" b="1" dirty="0">
                 <a:latin typeface="Arial-BoldMT"/>
               </a:rPr>
-              <a:t>Fundamentals of ARMv8</a:t>
+              <a:t>ARM Architecture History – ARMv8</a:t>
+            </a:r>
+            <a:endParaRPr lang="en-US" dirty="0"/>
+          </a:p>
+        </p:txBody>
+      </p:sp>
+      <p:graphicFrame>
+        <p:nvGraphicFramePr>
+          <p:cNvPr id="3" name="Table 2"/>
+          <p:cNvGraphicFramePr>
+            <a:graphicFrameLocks noGrp="1"/>
+          </p:cNvGraphicFramePr>
+          <p:nvPr>
+            <p:extLst>
+              <p:ext uri="{D42A27DB-BD31-4B8C-83A1-F6EECF244321}">
+                <p14:modId xmlns:p14="http://schemas.microsoft.com/office/powerpoint/2010/main" val="1585320651"/>
+              </p:ext>
+            </p:extLst>
+          </p:nvPr>
+        </p:nvGraphicFramePr>
+        <p:xfrm>
+          <a:off x="265286" y="1371628"/>
+          <a:ext cx="8674808" cy="986369"/>
+        </p:xfrm>
+        <a:graphic>
+          <a:graphicData uri="http://schemas.openxmlformats.org/drawingml/2006/table">
+            <a:tbl>
+              <a:tblPr firstRow="1" bandRow="1">
+                <a:tableStyleId>{5C22544A-7EE6-4342-B048-85BDC9FD1C3A}</a:tableStyleId>
+              </a:tblPr>
+              <a:tblGrid>
+                <a:gridCol w="2164244">
+                  <a:extLst>
+                    <a:ext uri="{9D8B030D-6E8A-4147-A177-3AD203B41FA5}">
+                      <a16:colId xmlns:a16="http://schemas.microsoft.com/office/drawing/2014/main" val="980716745"/>
+                    </a:ext>
+                  </a:extLst>
+                </a:gridCol>
+                <a:gridCol w="6510564">
+                  <a:extLst>
+                    <a:ext uri="{9D8B030D-6E8A-4147-A177-3AD203B41FA5}">
+                      <a16:colId xmlns:a16="http://schemas.microsoft.com/office/drawing/2014/main" val="2709679335"/>
+                    </a:ext>
+                  </a:extLst>
+                </a:gridCol>
+              </a:tblGrid>
+              <a:tr h="346289">
+                <a:tc>
+                  <a:txBody>
+                    <a:bodyPr/>
+                    <a:lstStyle/>
+                    <a:p>
+                      <a:r>
+                        <a:rPr lang="en-US" sz="1200" dirty="0"/>
+                        <a:t>ARM Version</a:t>
+                      </a:r>
+                    </a:p>
+                  </a:txBody>
+                  <a:tcPr/>
+                </a:tc>
+                <a:tc>
+                  <a:txBody>
+                    <a:bodyPr/>
+                    <a:lstStyle/>
+                    <a:p>
+                      <a:r>
+                        <a:rPr lang="en-US" sz="1200" dirty="0"/>
+                        <a:t>Features</a:t>
+                      </a:r>
+                    </a:p>
+                  </a:txBody>
+                  <a:tcPr/>
+                </a:tc>
+                <a:extLst>
+                  <a:ext uri="{0D108BD9-81ED-4DB2-BD59-A6C34878D82A}">
+                    <a16:rowId xmlns:a16="http://schemas.microsoft.com/office/drawing/2014/main" val="1564612189"/>
+                  </a:ext>
+                </a:extLst>
+              </a:tr>
+              <a:tr h="468131">
+                <a:tc>
+                  <a:txBody>
+                    <a:bodyPr/>
+                    <a:lstStyle/>
+                    <a:p>
+                      <a:r>
+                        <a:rPr lang="en-US" sz="1400" b="1" i="0" u="none" strike="noStrike" kern="1200" baseline="0" dirty="0">
+                          <a:solidFill>
+                            <a:schemeClr val="dk1"/>
+                          </a:solidFill>
+                          <a:latin typeface="Corbel" panose="020B0503020204020204" pitchFamily="34" charset="0"/>
+                          <a:ea typeface="+mn-ea"/>
+                          <a:cs typeface="+mn-cs"/>
+                        </a:rPr>
+                        <a:t>ARMv8-A</a:t>
+                      </a:r>
+                      <a:endParaRPr lang="en-US" sz="1100" dirty="0">
+                        <a:latin typeface="Corbel" panose="020B0503020204020204" pitchFamily="34" charset="0"/>
+                      </a:endParaRPr>
+                    </a:p>
+                  </a:txBody>
+                  <a:tcPr/>
+                </a:tc>
+                <a:tc>
+                  <a:txBody>
+                    <a:bodyPr/>
+                    <a:lstStyle/>
+                    <a:p>
+                      <a:pPr marL="171450" indent="-171450">
+                        <a:buFont typeface="Arial" panose="020B0604020202020204" pitchFamily="34" charset="0"/>
+                        <a:buChar char="•"/>
+                      </a:pPr>
+                      <a:r>
+                        <a:rPr lang="en-US" sz="1200" b="0" i="0" u="none" strike="noStrike" kern="1200" baseline="0" dirty="0">
+                          <a:solidFill>
+                            <a:schemeClr val="dk1"/>
+                          </a:solidFill>
+                          <a:latin typeface="Corbel" panose="020B0503020204020204" pitchFamily="34" charset="0"/>
+                          <a:ea typeface="+mn-ea"/>
+                          <a:cs typeface="+mn-cs"/>
+                        </a:rPr>
+                        <a:t>Includes both 32-bit execution and 64-bit execution. </a:t>
+                      </a:r>
+                    </a:p>
+                    <a:p>
+                      <a:pPr marL="171450" indent="-171450">
+                        <a:buFont typeface="Arial" panose="020B0604020202020204" pitchFamily="34" charset="0"/>
+                        <a:buChar char="•"/>
+                      </a:pPr>
+                      <a:r>
+                        <a:rPr lang="en-US" sz="1200" b="0" i="0" u="none" strike="noStrike" kern="1200" baseline="0" dirty="0">
+                          <a:solidFill>
+                            <a:schemeClr val="dk1"/>
+                          </a:solidFill>
+                          <a:latin typeface="Corbel" panose="020B0503020204020204" pitchFamily="34" charset="0"/>
+                          <a:ea typeface="+mn-ea"/>
+                          <a:cs typeface="+mn-cs"/>
+                        </a:rPr>
+                        <a:t>It introduces the ability to perform execution with 64-bit wide registers, while preserving backwards compatibility with existing ARMv7 software.</a:t>
+                      </a:r>
+                    </a:p>
+                  </a:txBody>
+                  <a:tcPr/>
+                </a:tc>
+                <a:extLst>
+                  <a:ext uri="{0D108BD9-81ED-4DB2-BD59-A6C34878D82A}">
+                    <a16:rowId xmlns:a16="http://schemas.microsoft.com/office/drawing/2014/main" val="532419933"/>
+                  </a:ext>
+                </a:extLst>
+              </a:tr>
+            </a:tbl>
+          </a:graphicData>
+        </a:graphic>
+      </p:graphicFrame>
+      <p:pic>
+        <p:nvPicPr>
+          <p:cNvPr id="5" name="Picture 4"/>
+          <p:cNvPicPr>
+            <a:picLocks noChangeAspect="1"/>
+          </p:cNvPicPr>
+          <p:nvPr/>
+        </p:nvPicPr>
+        <p:blipFill>
+          <a:blip r:embed="rId2"/>
+          <a:stretch>
+            <a:fillRect/>
+          </a:stretch>
+        </p:blipFill>
+        <p:spPr>
+          <a:xfrm>
+            <a:off x="265286" y="2516245"/>
+            <a:ext cx="5372663" cy="3256662"/>
+          </a:xfrm>
+          <a:prstGeom prst="rect">
+            <a:avLst/>
+          </a:prstGeom>
+        </p:spPr>
+      </p:pic>
+      <p:sp>
+        <p:nvSpPr>
+          <p:cNvPr id="6" name="Rectangle: Rounded Corners 5"/>
+          <p:cNvSpPr/>
+          <p:nvPr/>
+        </p:nvSpPr>
+        <p:spPr>
+          <a:xfrm>
+            <a:off x="6693659" y="2584938"/>
+            <a:ext cx="4492869" cy="4000500"/>
+          </a:xfrm>
+          <a:prstGeom prst="roundRect">
+            <a:avLst/>
+          </a:prstGeom>
+        </p:spPr>
+        <p:style>
+          <a:lnRef idx="2">
+            <a:schemeClr val="accent1">
+              <a:shade val="50000"/>
+            </a:schemeClr>
+          </a:lnRef>
+          <a:fillRef idx="1">
+            <a:schemeClr val="accent1"/>
+          </a:fillRef>
+          <a:effectRef idx="0">
+            <a:schemeClr val="accent1"/>
+          </a:effectRef>
+          <a:fontRef idx="minor">
+            <a:schemeClr val="lt1"/>
+          </a:fontRef>
+        </p:style>
+        <p:txBody>
+          <a:bodyPr rtlCol="0" anchor="ctr"/>
+          <a:lstStyle/>
+          <a:p>
+            <a:r>
+              <a:rPr lang="en-US" sz="1400" dirty="0"/>
+              <a:t>ARMv8-A architecture introduces a number of changes ::</a:t>
+            </a:r>
+          </a:p>
+          <a:p>
+            <a:pPr marL="285750" indent="-285750">
+              <a:buFont typeface="Arial" panose="020B0604020202020204" pitchFamily="34" charset="0"/>
+              <a:buChar char="•"/>
+            </a:pPr>
+            <a:r>
+              <a:rPr lang="en-US" sz="1200" dirty="0">
+                <a:latin typeface="Corbel" panose="020B0503020204020204" pitchFamily="34" charset="0"/>
+              </a:rPr>
+              <a:t>Large physical address</a:t>
+            </a:r>
+          </a:p>
+          <a:p>
+            <a:pPr marL="285750" indent="-285750">
+              <a:buFont typeface="Arial" panose="020B0604020202020204" pitchFamily="34" charset="0"/>
+              <a:buChar char="•"/>
+            </a:pPr>
+            <a:r>
+              <a:rPr lang="en-US" sz="1200" dirty="0">
+                <a:latin typeface="Corbel" panose="020B0503020204020204" pitchFamily="34" charset="0"/>
+              </a:rPr>
+              <a:t>64-bit virtual addressing</a:t>
+            </a:r>
+          </a:p>
+          <a:p>
+            <a:pPr marL="285750" indent="-285750">
+              <a:buFont typeface="Arial" panose="020B0604020202020204" pitchFamily="34" charset="0"/>
+              <a:buChar char="•"/>
+            </a:pPr>
+            <a:r>
+              <a:rPr lang="en-US" sz="1200" dirty="0">
+                <a:latin typeface="Corbel" panose="020B0503020204020204" pitchFamily="34" charset="0"/>
+              </a:rPr>
+              <a:t>Automatic event signaling</a:t>
+            </a:r>
+          </a:p>
+          <a:p>
+            <a:pPr marL="285750" indent="-285750">
+              <a:buFont typeface="Arial" panose="020B0604020202020204" pitchFamily="34" charset="0"/>
+              <a:buChar char="•"/>
+            </a:pPr>
+            <a:r>
+              <a:rPr lang="en-US" sz="1200" dirty="0">
+                <a:latin typeface="Corbel" panose="020B0503020204020204" pitchFamily="34" charset="0"/>
+              </a:rPr>
+              <a:t>Larger register files (31 * 64-bit general purpose registers) – increased performance and reduced stack use.</a:t>
+            </a:r>
+          </a:p>
+          <a:p>
+            <a:pPr marL="285750" indent="-285750">
+              <a:buFont typeface="Arial" panose="020B0604020202020204" pitchFamily="34" charset="0"/>
+              <a:buChar char="•"/>
+            </a:pPr>
+            <a:r>
+              <a:rPr lang="en-US" sz="1200" dirty="0">
+                <a:latin typeface="Corbel" panose="020B0503020204020204" pitchFamily="34" charset="0"/>
+              </a:rPr>
+              <a:t>Large PC-relative addressing range.</a:t>
+            </a:r>
+          </a:p>
+          <a:p>
+            <a:pPr marL="285750" indent="-285750">
+              <a:buFont typeface="Arial" panose="020B0604020202020204" pitchFamily="34" charset="0"/>
+              <a:buChar char="•"/>
+            </a:pPr>
+            <a:r>
+              <a:rPr lang="en-US" sz="1200" dirty="0">
+                <a:latin typeface="Corbel" panose="020B0503020204020204" pitchFamily="34" charset="0"/>
+              </a:rPr>
+              <a:t>Additional 16KB and 64KB translation granules - reduces Translation Lookaside Buffer (TLB) miss rates and depth of page walks.</a:t>
+            </a:r>
+          </a:p>
+          <a:p>
+            <a:pPr marL="285750" indent="-285750">
+              <a:buFont typeface="Arial" panose="020B0604020202020204" pitchFamily="34" charset="0"/>
+              <a:buChar char="•"/>
+            </a:pPr>
+            <a:r>
+              <a:rPr lang="en-US" sz="1200" dirty="0">
+                <a:latin typeface="Corbel" panose="020B0503020204020204" pitchFamily="34" charset="0"/>
+              </a:rPr>
+              <a:t>New exception model</a:t>
+            </a:r>
+          </a:p>
+          <a:p>
+            <a:pPr marL="285750" indent="-285750">
+              <a:buFont typeface="Arial" panose="020B0604020202020204" pitchFamily="34" charset="0"/>
+              <a:buChar char="•"/>
+            </a:pPr>
+            <a:r>
+              <a:rPr lang="en-US" sz="1200" dirty="0">
+                <a:latin typeface="Corbel" panose="020B0503020204020204" pitchFamily="34" charset="0"/>
+              </a:rPr>
+              <a:t>Efficient cache management</a:t>
+            </a:r>
+          </a:p>
+          <a:p>
+            <a:pPr marL="285750" indent="-285750">
+              <a:buFont typeface="Arial" panose="020B0604020202020204" pitchFamily="34" charset="0"/>
+              <a:buChar char="•"/>
+            </a:pPr>
+            <a:r>
+              <a:rPr lang="en-US" sz="1200" dirty="0">
+                <a:latin typeface="Corbel" panose="020B0503020204020204" pitchFamily="34" charset="0"/>
+              </a:rPr>
+              <a:t>Hardware-accelerated cryptography - Provides 3× to 10× better software encryption performance</a:t>
+            </a:r>
+          </a:p>
+          <a:p>
+            <a:pPr marL="285750" indent="-285750">
+              <a:buFont typeface="Arial" panose="020B0604020202020204" pitchFamily="34" charset="0"/>
+              <a:buChar char="•"/>
+            </a:pPr>
+            <a:r>
+              <a:rPr lang="en-US" sz="1200" dirty="0">
+                <a:latin typeface="Corbel" panose="020B0503020204020204" pitchFamily="34" charset="0"/>
+              </a:rPr>
+              <a:t>Load-Acquire, Store-Release instructions</a:t>
+            </a:r>
+          </a:p>
+          <a:p>
+            <a:pPr marL="285750" indent="-285750">
+              <a:buFont typeface="Arial" panose="020B0604020202020204" pitchFamily="34" charset="0"/>
+              <a:buChar char="•"/>
+            </a:pPr>
+            <a:r>
+              <a:rPr lang="en-US" sz="1200" dirty="0">
+                <a:latin typeface="Corbel" panose="020B0503020204020204" pitchFamily="34" charset="0"/>
+              </a:rPr>
+              <a:t>NEON double-precision floating-point advanced SIMD.</a:t>
+            </a:r>
+          </a:p>
+        </p:txBody>
+      </p:sp>
+    </p:spTree>
+    <p:extLst>
+      <p:ext uri="{BB962C8B-B14F-4D97-AF65-F5344CB8AC3E}">
+        <p14:creationId xmlns:p14="http://schemas.microsoft.com/office/powerpoint/2010/main" val="4256877324"/>
+      </p:ext>
+    </p:extLst>
+  </p:cSld>
+  <p:clrMapOvr>
+    <a:masterClrMapping/>
+  </p:clrMapOvr>
+</p:sld>
+</file>
+
+<file path=ppt/slides/slide4.xml><?xml version="1.0" encoding="utf-8"?>
+<p:sld xmlns:a="http://schemas.openxmlformats.org/drawingml/2006/main" xmlns:r="http://schemas.openxmlformats.org/officeDocument/2006/relationships" xmlns:p="http://schemas.openxmlformats.org/presentationml/2006/main">
+  <p:cSld>
+    <p:spTree>
+      <p:nvGrpSpPr>
+        <p:cNvPr id="1" name=""/>
+        <p:cNvGrpSpPr/>
+        <p:nvPr/>
+      </p:nvGrpSpPr>
+      <p:grpSpPr>
+        <a:xfrm>
+          <a:off x="0" y="0"/>
+          <a:ext cx="0" cy="0"/>
+          <a:chOff x="0" y="0"/>
+          <a:chExt cx="0" cy="0"/>
+        </a:xfrm>
+      </p:grpSpPr>
+      <p:sp>
+        <p:nvSpPr>
+          <p:cNvPr id="4" name="Rectangle 3"/>
+          <p:cNvSpPr/>
+          <p:nvPr/>
+        </p:nvSpPr>
+        <p:spPr>
+          <a:xfrm>
+            <a:off x="265286" y="316496"/>
+            <a:ext cx="9010599" cy="369332"/>
+          </a:xfrm>
+          <a:prstGeom prst="rect">
+            <a:avLst/>
+          </a:prstGeom>
+        </p:spPr>
+        <p:txBody>
+          <a:bodyPr wrap="square">
+            <a:spAutoFit/>
+          </a:bodyPr>
+          <a:lstStyle/>
+          <a:p>
+            <a:r>
+              <a:rPr lang="en-US" b="1" dirty="0"/>
+              <a:t>ARMv8-A Processor properties</a:t>
             </a:r>
             <a:endParaRPr lang="en-US" dirty="0"/>
           </a:p>
@@ -5983,7 +7016,7 @@
 </p:sld>
 </file>
 
-<file path=ppt/slides/slide4.xml><?xml version="1.0" encoding="utf-8"?>
+<file path=ppt/slides/slide5.xml><?xml version="1.0" encoding="utf-8"?>
 <p:sld xmlns:a="http://schemas.openxmlformats.org/drawingml/2006/main" xmlns:r="http://schemas.openxmlformats.org/officeDocument/2006/relationships" xmlns:p="http://schemas.openxmlformats.org/presentationml/2006/main">
   <p:cSld>
     <p:spTree>

</xml_diff>

<commit_message>
Ch2_ARMv8_Architecture.pptx presentation work completed
</commit_message>
<xml_diff>
--- a/Presentations/ARM_PPTs/Ch2_ARMv8_Architecture.pptx
+++ b/Presentations/ARM_PPTs/Ch2_ARMv8_Architecture.pptx
@@ -9,7 +9,11 @@
     <p:sldId id="262" r:id="rId3"/>
     <p:sldId id="265" r:id="rId4"/>
     <p:sldId id="263" r:id="rId5"/>
-    <p:sldId id="264" r:id="rId6"/>
+    <p:sldId id="266" r:id="rId6"/>
+    <p:sldId id="264" r:id="rId7"/>
+    <p:sldId id="269" r:id="rId8"/>
+    <p:sldId id="267" r:id="rId9"/>
+    <p:sldId id="268" r:id="rId10"/>
   </p:sldIdLst>
   <p:sldSz cx="12192000" cy="6858000"/>
   <p:notesSz cx="6858000" cy="9144000"/>
@@ -839,7 +843,7 @@
             <a:fld id="{B61BEF0D-F0BB-DE4B-95CE-6DB70DBA9567}" type="datetimeFigureOut">
               <a:rPr lang="en-US" dirty="0"/>
               <a:pPr/>
-              <a:t>5/26/2017</a:t>
+              <a:t>6/3/2017</a:t>
             </a:fld>
             <a:endParaRPr lang="en-US" dirty="0"/>
           </a:p>
@@ -1087,7 +1091,7 @@
             <a:fld id="{B61BEF0D-F0BB-DE4B-95CE-6DB70DBA9567}" type="datetimeFigureOut">
               <a:rPr lang="en-US" dirty="0"/>
               <a:pPr/>
-              <a:t>5/26/2017</a:t>
+              <a:t>6/3/2017</a:t>
             </a:fld>
             <a:endParaRPr lang="en-US" dirty="0"/>
           </a:p>
@@ -1398,7 +1402,7 @@
             <a:fld id="{B61BEF0D-F0BB-DE4B-95CE-6DB70DBA9567}" type="datetimeFigureOut">
               <a:rPr lang="en-US" dirty="0"/>
               <a:pPr/>
-              <a:t>5/26/2017</a:t>
+              <a:t>6/3/2017</a:t>
             </a:fld>
             <a:endParaRPr lang="en-US" dirty="0"/>
           </a:p>
@@ -1736,7 +1740,7 @@
             <a:fld id="{B61BEF0D-F0BB-DE4B-95CE-6DB70DBA9567}" type="datetimeFigureOut">
               <a:rPr lang="en-US" dirty="0"/>
               <a:pPr/>
-              <a:t>5/26/2017</a:t>
+              <a:t>6/3/2017</a:t>
             </a:fld>
             <a:endParaRPr lang="en-US" dirty="0"/>
           </a:p>
@@ -2047,7 +2051,7 @@
             <a:fld id="{B61BEF0D-F0BB-DE4B-95CE-6DB70DBA9567}" type="datetimeFigureOut">
               <a:rPr lang="en-US" dirty="0"/>
               <a:pPr/>
-              <a:t>5/26/2017</a:t>
+              <a:t>6/3/2017</a:t>
             </a:fld>
             <a:endParaRPr lang="en-US" dirty="0"/>
           </a:p>
@@ -2437,7 +2441,7 @@
             <a:fld id="{B61BEF0D-F0BB-DE4B-95CE-6DB70DBA9567}" type="datetimeFigureOut">
               <a:rPr lang="en-US" dirty="0"/>
               <a:pPr/>
-              <a:t>5/26/2017</a:t>
+              <a:t>6/3/2017</a:t>
             </a:fld>
             <a:endParaRPr lang="en-US" dirty="0"/>
           </a:p>
@@ -2603,7 +2607,7 @@
           <a:p>
             <a:fld id="{55C6B4A9-1611-4792-9094-5F34BCA07E0B}" type="datetimeFigureOut">
               <a:rPr lang="en-US" dirty="0"/>
-              <a:t>5/26/2017</a:t>
+              <a:t>6/3/2017</a:t>
             </a:fld>
             <a:endParaRPr lang="en-US" dirty="0"/>
           </a:p>
@@ -2779,7 +2783,7 @@
             <a:fld id="{B61BEF0D-F0BB-DE4B-95CE-6DB70DBA9567}" type="datetimeFigureOut">
               <a:rPr lang="en-US" dirty="0"/>
               <a:pPr/>
-              <a:t>5/26/2017</a:t>
+              <a:t>6/3/2017</a:t>
             </a:fld>
             <a:endParaRPr lang="en-US" dirty="0"/>
           </a:p>
@@ -2952,7 +2956,7 @@
             <a:fld id="{B61BEF0D-F0BB-DE4B-95CE-6DB70DBA9567}" type="datetimeFigureOut">
               <a:rPr lang="en-US" dirty="0"/>
               <a:pPr/>
-              <a:t>5/26/2017</a:t>
+              <a:t>6/3/2017</a:t>
             </a:fld>
             <a:endParaRPr lang="en-US" dirty="0"/>
           </a:p>
@@ -3196,7 +3200,7 @@
             <a:fld id="{B61BEF0D-F0BB-DE4B-95CE-6DB70DBA9567}" type="datetimeFigureOut">
               <a:rPr lang="en-US" dirty="0"/>
               <a:pPr/>
-              <a:t>5/26/2017</a:t>
+              <a:t>6/3/2017</a:t>
             </a:fld>
             <a:endParaRPr lang="en-US" dirty="0"/>
           </a:p>
@@ -3424,7 +3428,7 @@
           <a:p>
             <a:fld id="{EB712588-04B1-427B-82EE-E8DB90309F08}" type="datetimeFigureOut">
               <a:rPr lang="en-US" dirty="0"/>
-              <a:t>5/26/2017</a:t>
+              <a:t>6/3/2017</a:t>
             </a:fld>
             <a:endParaRPr lang="en-US" dirty="0"/>
           </a:p>
@@ -3794,7 +3798,7 @@
             <a:fld id="{B61BEF0D-F0BB-DE4B-95CE-6DB70DBA9567}" type="datetimeFigureOut">
               <a:rPr lang="en-US" dirty="0"/>
               <a:pPr/>
-              <a:t>5/26/2017</a:t>
+              <a:t>6/3/2017</a:t>
             </a:fld>
             <a:endParaRPr lang="en-US" dirty="0"/>
           </a:p>
@@ -3914,7 +3918,7 @@
             <a:fld id="{B61BEF0D-F0BB-DE4B-95CE-6DB70DBA9567}" type="datetimeFigureOut">
               <a:rPr lang="en-US" dirty="0"/>
               <a:pPr/>
-              <a:t>5/26/2017</a:t>
+              <a:t>6/3/2017</a:t>
             </a:fld>
             <a:endParaRPr lang="en-US" dirty="0"/>
           </a:p>
@@ -4006,7 +4010,7 @@
             <a:fld id="{B61BEF0D-F0BB-DE4B-95CE-6DB70DBA9567}" type="datetimeFigureOut">
               <a:rPr lang="en-US" dirty="0"/>
               <a:pPr/>
-              <a:t>5/26/2017</a:t>
+              <a:t>6/3/2017</a:t>
             </a:fld>
             <a:endParaRPr lang="en-US" dirty="0"/>
           </a:p>
@@ -4257,7 +4261,7 @@
           <a:p>
             <a:fld id="{42A54C80-263E-416B-A8E0-580EDEADCBDC}" type="datetimeFigureOut">
               <a:rPr lang="en-US" dirty="0"/>
-              <a:t>5/26/2017</a:t>
+              <a:t>6/3/2017</a:t>
             </a:fld>
             <a:endParaRPr lang="en-US" dirty="0"/>
           </a:p>
@@ -4516,7 +4520,7 @@
             <a:fld id="{B61BEF0D-F0BB-DE4B-95CE-6DB70DBA9567}" type="datetimeFigureOut">
               <a:rPr lang="en-US" dirty="0"/>
               <a:pPr/>
-              <a:t>5/26/2017</a:t>
+              <a:t>6/3/2017</a:t>
             </a:fld>
             <a:endParaRPr lang="en-US" dirty="0"/>
           </a:p>
@@ -5256,7 +5260,7 @@
             <a:fld id="{B61BEF0D-F0BB-DE4B-95CE-6DB70DBA9567}" type="datetimeFigureOut">
               <a:rPr lang="en-US" dirty="0"/>
               <a:pPr/>
-              <a:t>5/26/2017</a:t>
+              <a:t>6/3/2017</a:t>
             </a:fld>
             <a:endParaRPr lang="en-US" dirty="0"/>
           </a:p>
@@ -7003,6 +7007,30 @@
           </a:p>
         </p:txBody>
       </p:sp>
+      <p:pic>
+        <p:nvPicPr>
+          <p:cNvPr id="2" name="Picture 1"/>
+          <p:cNvPicPr>
+            <a:picLocks noChangeAspect="1"/>
+          </p:cNvPicPr>
+          <p:nvPr/>
+        </p:nvPicPr>
+        <p:blipFill>
+          <a:blip r:embed="rId2"/>
+          <a:stretch>
+            <a:fillRect/>
+          </a:stretch>
+        </p:blipFill>
+        <p:spPr>
+          <a:xfrm>
+            <a:off x="896815" y="909325"/>
+            <a:ext cx="8460748" cy="5680998"/>
+          </a:xfrm>
+          <a:prstGeom prst="rect">
+            <a:avLst/>
+          </a:prstGeom>
+        </p:spPr>
+      </p:pic>
     </p:spTree>
     <p:extLst>
       <p:ext uri="{BB962C8B-B14F-4D97-AF65-F5344CB8AC3E}">
@@ -7055,10 +7083,186 @@
           <a:lstStyle/>
           <a:p>
             <a:r>
+              <a:rPr lang="en-US" b="1" dirty="0"/>
+              <a:t>ARMv8-A Processor properties							…contd.</a:t>
+            </a:r>
+            <a:endParaRPr lang="en-US" dirty="0"/>
+          </a:p>
+        </p:txBody>
+      </p:sp>
+      <p:pic>
+        <p:nvPicPr>
+          <p:cNvPr id="5" name="Picture 4"/>
+          <p:cNvPicPr>
+            <a:picLocks noChangeAspect="1"/>
+          </p:cNvPicPr>
+          <p:nvPr/>
+        </p:nvPicPr>
+        <p:blipFill>
+          <a:blip r:embed="rId2"/>
+          <a:stretch>
+            <a:fillRect/>
+          </a:stretch>
+        </p:blipFill>
+        <p:spPr>
+          <a:xfrm>
+            <a:off x="1248508" y="922317"/>
+            <a:ext cx="6983971" cy="5698289"/>
+          </a:xfrm>
+          <a:prstGeom prst="rect">
+            <a:avLst/>
+          </a:prstGeom>
+        </p:spPr>
+      </p:pic>
+    </p:spTree>
+    <p:extLst>
+      <p:ext uri="{BB962C8B-B14F-4D97-AF65-F5344CB8AC3E}">
+        <p14:creationId xmlns:p14="http://schemas.microsoft.com/office/powerpoint/2010/main" val="2780284488"/>
+      </p:ext>
+    </p:extLst>
+  </p:cSld>
+  <p:clrMapOvr>
+    <a:masterClrMapping/>
+  </p:clrMapOvr>
+</p:sld>
+</file>
+
+<file path=ppt/slides/slide6.xml><?xml version="1.0" encoding="utf-8"?>
+<p:sld xmlns:a="http://schemas.openxmlformats.org/drawingml/2006/main" xmlns:r="http://schemas.openxmlformats.org/officeDocument/2006/relationships" xmlns:p="http://schemas.openxmlformats.org/presentationml/2006/main">
+  <p:cSld>
+    <p:spTree>
+      <p:nvGrpSpPr>
+        <p:cNvPr id="1" name=""/>
+        <p:cNvGrpSpPr/>
+        <p:nvPr/>
+      </p:nvGrpSpPr>
+      <p:grpSpPr>
+        <a:xfrm>
+          <a:off x="0" y="0"/>
+          <a:ext cx="0" cy="0"/>
+          <a:chOff x="0" y="0"/>
+          <a:chExt cx="0" cy="0"/>
+        </a:xfrm>
+      </p:grpSpPr>
+      <p:sp>
+        <p:nvSpPr>
+          <p:cNvPr id="4" name="Rectangle 3"/>
+          <p:cNvSpPr/>
+          <p:nvPr/>
+        </p:nvSpPr>
+        <p:spPr>
+          <a:xfrm>
+            <a:off x="265286" y="316496"/>
+            <a:ext cx="9010599" cy="369332"/>
+          </a:xfrm>
+          <a:prstGeom prst="rect">
+            <a:avLst/>
+          </a:prstGeom>
+        </p:spPr>
+        <p:txBody>
+          <a:bodyPr wrap="square">
+            <a:spAutoFit/>
+          </a:bodyPr>
+          <a:lstStyle/>
+          <a:p>
+            <a:r>
               <a:rPr lang="en-US" b="1" dirty="0">
                 <a:latin typeface="Arial-BoldMT"/>
               </a:rPr>
-              <a:t>Fundamentals of ARMv8</a:t>
+              <a:t>ARMv8 Compatible Processors</a:t>
+            </a:r>
+            <a:endParaRPr lang="en-US" dirty="0"/>
+          </a:p>
+        </p:txBody>
+      </p:sp>
+      <p:sp>
+        <p:nvSpPr>
+          <p:cNvPr id="3" name="Rectangle 2"/>
+          <p:cNvSpPr/>
+          <p:nvPr/>
+        </p:nvSpPr>
+        <p:spPr>
+          <a:xfrm>
+            <a:off x="2378473" y="967071"/>
+            <a:ext cx="2595582" cy="369332"/>
+          </a:xfrm>
+          <a:prstGeom prst="rect">
+            <a:avLst/>
+          </a:prstGeom>
+        </p:spPr>
+        <p:txBody>
+          <a:bodyPr wrap="none">
+            <a:spAutoFit/>
+          </a:bodyPr>
+          <a:lstStyle/>
+          <a:p>
+            <a:r>
+              <a:rPr lang="en-US" b="1" dirty="0">
+                <a:latin typeface="Arial-BoldMT"/>
+              </a:rPr>
+              <a:t>Cortex-A53 processor</a:t>
+            </a:r>
+            <a:endParaRPr lang="en-US" dirty="0"/>
+          </a:p>
+        </p:txBody>
+      </p:sp>
+      <p:sp>
+        <p:nvSpPr>
+          <p:cNvPr id="5" name="Rectangle 4"/>
+          <p:cNvSpPr/>
+          <p:nvPr/>
+        </p:nvSpPr>
+        <p:spPr>
+          <a:xfrm>
+            <a:off x="2378473" y="1846356"/>
+            <a:ext cx="2595582" cy="369332"/>
+          </a:xfrm>
+          <a:prstGeom prst="rect">
+            <a:avLst/>
+          </a:prstGeom>
+        </p:spPr>
+        <p:txBody>
+          <a:bodyPr wrap="none">
+            <a:spAutoFit/>
+          </a:bodyPr>
+          <a:lstStyle/>
+          <a:p>
+            <a:r>
+              <a:rPr lang="en-US" b="1" dirty="0">
+                <a:latin typeface="Arial-BoldMT"/>
+              </a:rPr>
+              <a:t>Cortex-A57 processor</a:t>
+            </a:r>
+            <a:endParaRPr lang="en-US" dirty="0"/>
+          </a:p>
+        </p:txBody>
+      </p:sp>
+      <p:sp>
+        <p:nvSpPr>
+          <p:cNvPr id="6" name="Rectangle 5"/>
+          <p:cNvSpPr/>
+          <p:nvPr/>
+        </p:nvSpPr>
+        <p:spPr>
+          <a:xfrm>
+            <a:off x="2378473" y="2725641"/>
+            <a:ext cx="2595582" cy="369332"/>
+          </a:xfrm>
+          <a:prstGeom prst="rect">
+            <a:avLst/>
+          </a:prstGeom>
+        </p:spPr>
+        <p:txBody>
+          <a:bodyPr wrap="none">
+            <a:spAutoFit/>
+          </a:bodyPr>
+          <a:lstStyle/>
+          <a:p>
+            <a:r>
+              <a:rPr lang="en-US" b="1" dirty="0">
+                <a:latin typeface="Arial-BoldMT"/>
+              </a:rPr>
+              <a:t>Cortex-A72 processor</a:t>
             </a:r>
             <a:endParaRPr lang="en-US" dirty="0"/>
           </a:p>
@@ -7068,6 +7272,1392 @@
     <p:extLst>
       <p:ext uri="{BB962C8B-B14F-4D97-AF65-F5344CB8AC3E}">
         <p14:creationId xmlns:p14="http://schemas.microsoft.com/office/powerpoint/2010/main" val="500158562"/>
+      </p:ext>
+    </p:extLst>
+  </p:cSld>
+  <p:clrMapOvr>
+    <a:masterClrMapping/>
+  </p:clrMapOvr>
+</p:sld>
+</file>
+
+<file path=ppt/slides/slide7.xml><?xml version="1.0" encoding="utf-8"?>
+<p:sld xmlns:a="http://schemas.openxmlformats.org/drawingml/2006/main" xmlns:r="http://schemas.openxmlformats.org/officeDocument/2006/relationships" xmlns:p="http://schemas.openxmlformats.org/presentationml/2006/main">
+  <p:cSld>
+    <p:bg>
+      <p:bgPr>
+        <a:solidFill>
+          <a:schemeClr val="bg1"/>
+        </a:solidFill>
+        <a:effectLst/>
+      </p:bgPr>
+    </p:bg>
+    <p:spTree>
+      <p:nvGrpSpPr>
+        <p:cNvPr id="1" name=""/>
+        <p:cNvGrpSpPr/>
+        <p:nvPr/>
+      </p:nvGrpSpPr>
+      <p:grpSpPr>
+        <a:xfrm>
+          <a:off x="0" y="0"/>
+          <a:ext cx="0" cy="0"/>
+          <a:chOff x="0" y="0"/>
+          <a:chExt cx="0" cy="0"/>
+        </a:xfrm>
+      </p:grpSpPr>
+      <p:sp>
+        <p:nvSpPr>
+          <p:cNvPr id="4" name="Rectangle 3"/>
+          <p:cNvSpPr/>
+          <p:nvPr/>
+        </p:nvSpPr>
+        <p:spPr>
+          <a:xfrm>
+            <a:off x="265286" y="316496"/>
+            <a:ext cx="9010599" cy="369332"/>
+          </a:xfrm>
+          <a:prstGeom prst="rect">
+            <a:avLst/>
+          </a:prstGeom>
+        </p:spPr>
+        <p:txBody>
+          <a:bodyPr wrap="square">
+            <a:spAutoFit/>
+          </a:bodyPr>
+          <a:lstStyle/>
+          <a:p>
+            <a:r>
+              <a:rPr lang="en-US" b="1" dirty="0">
+                <a:latin typeface="Arial-BoldMT"/>
+              </a:rPr>
+              <a:t>ARMv8 Processors</a:t>
+            </a:r>
+            <a:endParaRPr lang="en-US" dirty="0"/>
+          </a:p>
+        </p:txBody>
+      </p:sp>
+      <p:sp>
+        <p:nvSpPr>
+          <p:cNvPr id="3" name="Rectangle 2"/>
+          <p:cNvSpPr/>
+          <p:nvPr/>
+        </p:nvSpPr>
+        <p:spPr>
+          <a:xfrm>
+            <a:off x="2835673" y="316496"/>
+            <a:ext cx="2595582" cy="369332"/>
+          </a:xfrm>
+          <a:prstGeom prst="rect">
+            <a:avLst/>
+          </a:prstGeom>
+        </p:spPr>
+        <p:txBody>
+          <a:bodyPr wrap="none">
+            <a:spAutoFit/>
+          </a:bodyPr>
+          <a:lstStyle/>
+          <a:p>
+            <a:r>
+              <a:rPr lang="en-US" b="1" dirty="0">
+                <a:latin typeface="Arial-BoldMT"/>
+              </a:rPr>
+              <a:t>Cortex-A53 processor</a:t>
+            </a:r>
+            <a:endParaRPr lang="en-US" dirty="0"/>
+          </a:p>
+        </p:txBody>
+      </p:sp>
+      <p:grpSp>
+        <p:nvGrpSpPr>
+          <p:cNvPr id="8" name="Group 7"/>
+          <p:cNvGrpSpPr/>
+          <p:nvPr/>
+        </p:nvGrpSpPr>
+        <p:grpSpPr>
+          <a:xfrm>
+            <a:off x="791308" y="1805407"/>
+            <a:ext cx="4268824" cy="4683316"/>
+            <a:chOff x="756138" y="1442933"/>
+            <a:chExt cx="4383317" cy="5271625"/>
+          </a:xfrm>
+        </p:grpSpPr>
+        <p:pic>
+          <p:nvPicPr>
+            <p:cNvPr id="2" name="Picture 1"/>
+            <p:cNvPicPr>
+              <a:picLocks noChangeAspect="1"/>
+            </p:cNvPicPr>
+            <p:nvPr/>
+          </p:nvPicPr>
+          <p:blipFill>
+            <a:blip r:embed="rId2"/>
+            <a:stretch>
+              <a:fillRect/>
+            </a:stretch>
+          </p:blipFill>
+          <p:spPr>
+            <a:xfrm>
+              <a:off x="756138" y="1442933"/>
+              <a:ext cx="4383317" cy="5054582"/>
+            </a:xfrm>
+            <a:prstGeom prst="rect">
+              <a:avLst/>
+            </a:prstGeom>
+          </p:spPr>
+        </p:pic>
+        <p:pic>
+          <p:nvPicPr>
+            <p:cNvPr id="7" name="Picture 6"/>
+            <p:cNvPicPr>
+              <a:picLocks noChangeAspect="1"/>
+            </p:cNvPicPr>
+            <p:nvPr/>
+          </p:nvPicPr>
+          <p:blipFill>
+            <a:blip r:embed="rId3"/>
+            <a:stretch>
+              <a:fillRect/>
+            </a:stretch>
+          </p:blipFill>
+          <p:spPr>
+            <a:xfrm>
+              <a:off x="2131714" y="6488722"/>
+              <a:ext cx="1632163" cy="225836"/>
+            </a:xfrm>
+            <a:prstGeom prst="rect">
+              <a:avLst/>
+            </a:prstGeom>
+          </p:spPr>
+        </p:pic>
+      </p:grpSp>
+      <p:sp>
+        <p:nvSpPr>
+          <p:cNvPr id="9" name="Rectangle 8"/>
+          <p:cNvSpPr/>
+          <p:nvPr/>
+        </p:nvSpPr>
+        <p:spPr>
+          <a:xfrm>
+            <a:off x="6153004" y="3369963"/>
+            <a:ext cx="3262496" cy="369332"/>
+          </a:xfrm>
+          <a:prstGeom prst="rect">
+            <a:avLst/>
+          </a:prstGeom>
+        </p:spPr>
+        <p:txBody>
+          <a:bodyPr wrap="none">
+            <a:spAutoFit/>
+          </a:bodyPr>
+          <a:lstStyle/>
+          <a:p>
+            <a:r>
+              <a:rPr lang="en-US" dirty="0">
+                <a:latin typeface="TimesNewRomanPSMT"/>
+              </a:rPr>
+              <a:t>Mid-range, low-power processor.</a:t>
+            </a:r>
+            <a:endParaRPr lang="en-US" dirty="0"/>
+          </a:p>
+        </p:txBody>
+      </p:sp>
+      <p:sp>
+        <p:nvSpPr>
+          <p:cNvPr id="10" name="Rectangle 9"/>
+          <p:cNvSpPr/>
+          <p:nvPr/>
+        </p:nvSpPr>
+        <p:spPr>
+          <a:xfrm>
+            <a:off x="6153004" y="4180398"/>
+            <a:ext cx="5531973" cy="369332"/>
+          </a:xfrm>
+          <a:prstGeom prst="rect">
+            <a:avLst/>
+          </a:prstGeom>
+        </p:spPr>
+        <p:txBody>
+          <a:bodyPr wrap="square">
+            <a:spAutoFit/>
+          </a:bodyPr>
+          <a:lstStyle/>
+          <a:p>
+            <a:r>
+              <a:rPr lang="en-US" dirty="0">
+                <a:latin typeface="TimesNewRomanPSMT"/>
+              </a:rPr>
+              <a:t>One and four cores in a single cluster.</a:t>
+            </a:r>
+            <a:endParaRPr lang="en-US" dirty="0"/>
+          </a:p>
+        </p:txBody>
+      </p:sp>
+      <p:sp>
+        <p:nvSpPr>
+          <p:cNvPr id="11" name="Rectangle 10"/>
+          <p:cNvSpPr/>
+          <p:nvPr/>
+        </p:nvSpPr>
+        <p:spPr>
+          <a:xfrm>
+            <a:off x="6153004" y="4549730"/>
+            <a:ext cx="3820277" cy="369332"/>
+          </a:xfrm>
+          <a:prstGeom prst="rect">
+            <a:avLst/>
+          </a:prstGeom>
+        </p:spPr>
+        <p:txBody>
+          <a:bodyPr wrap="none">
+            <a:spAutoFit/>
+          </a:bodyPr>
+          <a:lstStyle/>
+          <a:p>
+            <a:r>
+              <a:rPr lang="en-US" dirty="0">
+                <a:latin typeface="TimesNewRomanPSMT"/>
+              </a:rPr>
+              <a:t>Each core with an L1 cache subsystem.</a:t>
+            </a:r>
+            <a:endParaRPr lang="en-US" dirty="0"/>
+          </a:p>
+        </p:txBody>
+      </p:sp>
+      <p:sp>
+        <p:nvSpPr>
+          <p:cNvPr id="12" name="Rectangle 11"/>
+          <p:cNvSpPr/>
+          <p:nvPr/>
+        </p:nvSpPr>
+        <p:spPr>
+          <a:xfrm>
+            <a:off x="6153004" y="4965228"/>
+            <a:ext cx="6096000" cy="369332"/>
+          </a:xfrm>
+          <a:prstGeom prst="rect">
+            <a:avLst/>
+          </a:prstGeom>
+        </p:spPr>
+        <p:txBody>
+          <a:bodyPr>
+            <a:spAutoFit/>
+          </a:bodyPr>
+          <a:lstStyle/>
+          <a:p>
+            <a:r>
+              <a:rPr lang="en-US" dirty="0">
+                <a:latin typeface="TimesNewRomanPSMT"/>
+              </a:rPr>
+              <a:t>Optional integrated GICv3/4 interface.</a:t>
+            </a:r>
+            <a:endParaRPr lang="en-US" dirty="0"/>
+          </a:p>
+        </p:txBody>
+      </p:sp>
+      <p:sp>
+        <p:nvSpPr>
+          <p:cNvPr id="13" name="Rectangle 12"/>
+          <p:cNvSpPr/>
+          <p:nvPr/>
+        </p:nvSpPr>
+        <p:spPr>
+          <a:xfrm>
+            <a:off x="6153004" y="5334560"/>
+            <a:ext cx="2890600" cy="369332"/>
+          </a:xfrm>
+          <a:prstGeom prst="rect">
+            <a:avLst/>
+          </a:prstGeom>
+        </p:spPr>
+        <p:txBody>
+          <a:bodyPr wrap="none">
+            <a:spAutoFit/>
+          </a:bodyPr>
+          <a:lstStyle/>
+          <a:p>
+            <a:r>
+              <a:rPr lang="en-US" dirty="0">
+                <a:latin typeface="TimesNewRomanPSMT"/>
+              </a:rPr>
+              <a:t>Optional L2 cache controller.</a:t>
+            </a:r>
+            <a:endParaRPr lang="en-US" dirty="0"/>
+          </a:p>
+        </p:txBody>
+      </p:sp>
+      <p:sp>
+        <p:nvSpPr>
+          <p:cNvPr id="14" name="Rectangle 13"/>
+          <p:cNvSpPr/>
+          <p:nvPr/>
+        </p:nvSpPr>
+        <p:spPr>
+          <a:xfrm>
+            <a:off x="6153004" y="5750058"/>
+            <a:ext cx="6096000" cy="369332"/>
+          </a:xfrm>
+          <a:prstGeom prst="rect">
+            <a:avLst/>
+          </a:prstGeom>
+        </p:spPr>
+        <p:txBody>
+          <a:bodyPr>
+            <a:spAutoFit/>
+          </a:bodyPr>
+          <a:lstStyle/>
+          <a:p>
+            <a:r>
+              <a:rPr lang="en-US" dirty="0">
+                <a:latin typeface="TimesNewRomanPSMT"/>
+              </a:rPr>
+              <a:t>Capable of supporting 32-bit and 64-bit code.</a:t>
+            </a:r>
+            <a:endParaRPr lang="en-US" dirty="0"/>
+          </a:p>
+        </p:txBody>
+      </p:sp>
+      <p:sp>
+        <p:nvSpPr>
+          <p:cNvPr id="15" name="Rectangle 14"/>
+          <p:cNvSpPr/>
+          <p:nvPr/>
+        </p:nvSpPr>
+        <p:spPr>
+          <a:xfrm>
+            <a:off x="6153004" y="6119390"/>
+            <a:ext cx="5907771" cy="369332"/>
+          </a:xfrm>
+          <a:prstGeom prst="rect">
+            <a:avLst/>
+          </a:prstGeom>
+        </p:spPr>
+        <p:txBody>
+          <a:bodyPr wrap="none">
+            <a:spAutoFit/>
+          </a:bodyPr>
+          <a:lstStyle/>
+          <a:p>
+            <a:r>
+              <a:rPr lang="en-US" dirty="0">
+                <a:latin typeface="TimesNewRomanPSMT"/>
+              </a:rPr>
+              <a:t>Capable of deployment as a standalone applications processor</a:t>
+            </a:r>
+            <a:endParaRPr lang="en-US" dirty="0"/>
+          </a:p>
+        </p:txBody>
+      </p:sp>
+      <p:sp>
+        <p:nvSpPr>
+          <p:cNvPr id="16" name="Rectangle 15"/>
+          <p:cNvSpPr/>
+          <p:nvPr/>
+        </p:nvSpPr>
+        <p:spPr>
+          <a:xfrm>
+            <a:off x="6153004" y="3785461"/>
+            <a:ext cx="3591752" cy="369332"/>
+          </a:xfrm>
+          <a:prstGeom prst="rect">
+            <a:avLst/>
+          </a:prstGeom>
+        </p:spPr>
+        <p:txBody>
+          <a:bodyPr wrap="none">
+            <a:spAutoFit/>
+          </a:bodyPr>
+          <a:lstStyle/>
+          <a:p>
+            <a:r>
+              <a:rPr lang="en-US" dirty="0">
+                <a:latin typeface="TimesNewRomanPSMT"/>
+              </a:rPr>
+              <a:t>Extremely power efficient processor.</a:t>
+            </a:r>
+            <a:endParaRPr lang="en-US" dirty="0"/>
+          </a:p>
+        </p:txBody>
+      </p:sp>
+    </p:spTree>
+    <p:extLst>
+      <p:ext uri="{BB962C8B-B14F-4D97-AF65-F5344CB8AC3E}">
+        <p14:creationId xmlns:p14="http://schemas.microsoft.com/office/powerpoint/2010/main" val="251393119"/>
+      </p:ext>
+    </p:extLst>
+  </p:cSld>
+  <p:clrMapOvr>
+    <a:masterClrMapping/>
+  </p:clrMapOvr>
+</p:sld>
+</file>
+
+<file path=ppt/slides/slide8.xml><?xml version="1.0" encoding="utf-8"?>
+<p:sld xmlns:a="http://schemas.openxmlformats.org/drawingml/2006/main" xmlns:r="http://schemas.openxmlformats.org/officeDocument/2006/relationships" xmlns:p="http://schemas.openxmlformats.org/presentationml/2006/main">
+  <p:cSld>
+    <p:spTree>
+      <p:nvGrpSpPr>
+        <p:cNvPr id="1" name=""/>
+        <p:cNvGrpSpPr/>
+        <p:nvPr/>
+      </p:nvGrpSpPr>
+      <p:grpSpPr>
+        <a:xfrm>
+          <a:off x="0" y="0"/>
+          <a:ext cx="0" cy="0"/>
+          <a:chOff x="0" y="0"/>
+          <a:chExt cx="0" cy="0"/>
+        </a:xfrm>
+      </p:grpSpPr>
+      <p:sp>
+        <p:nvSpPr>
+          <p:cNvPr id="4" name="Rectangle 3"/>
+          <p:cNvSpPr/>
+          <p:nvPr/>
+        </p:nvSpPr>
+        <p:spPr>
+          <a:xfrm>
+            <a:off x="265286" y="316496"/>
+            <a:ext cx="9010599" cy="369332"/>
+          </a:xfrm>
+          <a:prstGeom prst="rect">
+            <a:avLst/>
+          </a:prstGeom>
+        </p:spPr>
+        <p:txBody>
+          <a:bodyPr wrap="square">
+            <a:spAutoFit/>
+          </a:bodyPr>
+          <a:lstStyle/>
+          <a:p>
+            <a:r>
+              <a:rPr lang="en-US" b="1" dirty="0">
+                <a:latin typeface="Arial-BoldMT"/>
+              </a:rPr>
+              <a:t>ARMv8 Processors</a:t>
+            </a:r>
+            <a:endParaRPr lang="en-US" dirty="0"/>
+          </a:p>
+        </p:txBody>
+      </p:sp>
+      <p:sp>
+        <p:nvSpPr>
+          <p:cNvPr id="5" name="Rectangle 4"/>
+          <p:cNvSpPr/>
+          <p:nvPr/>
+        </p:nvSpPr>
+        <p:spPr>
+          <a:xfrm>
+            <a:off x="2914804" y="316496"/>
+            <a:ext cx="2595582" cy="369332"/>
+          </a:xfrm>
+          <a:prstGeom prst="rect">
+            <a:avLst/>
+          </a:prstGeom>
+        </p:spPr>
+        <p:txBody>
+          <a:bodyPr wrap="none">
+            <a:spAutoFit/>
+          </a:bodyPr>
+          <a:lstStyle/>
+          <a:p>
+            <a:r>
+              <a:rPr lang="en-US" b="1" dirty="0">
+                <a:latin typeface="Arial-BoldMT"/>
+              </a:rPr>
+              <a:t>Cortex-A57 processor</a:t>
+            </a:r>
+            <a:endParaRPr lang="en-US" dirty="0"/>
+          </a:p>
+        </p:txBody>
+      </p:sp>
+      <p:grpSp>
+        <p:nvGrpSpPr>
+          <p:cNvPr id="9" name="Group 8"/>
+          <p:cNvGrpSpPr/>
+          <p:nvPr/>
+        </p:nvGrpSpPr>
+        <p:grpSpPr>
+          <a:xfrm>
+            <a:off x="627338" y="1716881"/>
+            <a:ext cx="4029807" cy="4925823"/>
+            <a:chOff x="627338" y="1716881"/>
+            <a:chExt cx="4029807" cy="4925823"/>
+          </a:xfrm>
+        </p:grpSpPr>
+        <p:pic>
+          <p:nvPicPr>
+            <p:cNvPr id="7" name="Picture 6"/>
+            <p:cNvPicPr>
+              <a:picLocks noChangeAspect="1"/>
+            </p:cNvPicPr>
+            <p:nvPr/>
+          </p:nvPicPr>
+          <p:blipFill>
+            <a:blip r:embed="rId2"/>
+            <a:stretch>
+              <a:fillRect/>
+            </a:stretch>
+          </p:blipFill>
+          <p:spPr>
+            <a:xfrm>
+              <a:off x="627338" y="1716881"/>
+              <a:ext cx="4029807" cy="4693810"/>
+            </a:xfrm>
+            <a:prstGeom prst="rect">
+              <a:avLst/>
+            </a:prstGeom>
+          </p:spPr>
+        </p:pic>
+        <p:pic>
+          <p:nvPicPr>
+            <p:cNvPr id="8" name="Picture 7"/>
+            <p:cNvPicPr>
+              <a:picLocks noChangeAspect="1"/>
+            </p:cNvPicPr>
+            <p:nvPr/>
+          </p:nvPicPr>
+          <p:blipFill>
+            <a:blip r:embed="rId3"/>
+            <a:stretch>
+              <a:fillRect/>
+            </a:stretch>
+          </p:blipFill>
+          <p:spPr>
+            <a:xfrm>
+              <a:off x="1662631" y="6410691"/>
+              <a:ext cx="1959219" cy="232013"/>
+            </a:xfrm>
+            <a:prstGeom prst="rect">
+              <a:avLst/>
+            </a:prstGeom>
+          </p:spPr>
+        </p:pic>
+      </p:grpSp>
+      <p:sp>
+        <p:nvSpPr>
+          <p:cNvPr id="10" name="Rectangle 9"/>
+          <p:cNvSpPr/>
+          <p:nvPr/>
+        </p:nvSpPr>
+        <p:spPr>
+          <a:xfrm>
+            <a:off x="4955930" y="982452"/>
+            <a:ext cx="7063154" cy="523220"/>
+          </a:xfrm>
+          <a:prstGeom prst="rect">
+            <a:avLst/>
+          </a:prstGeom>
+        </p:spPr>
+        <p:txBody>
+          <a:bodyPr wrap="square">
+            <a:spAutoFit/>
+          </a:bodyPr>
+          <a:lstStyle/>
+          <a:p>
+            <a:r>
+              <a:rPr lang="en-US" sz="1400" dirty="0">
+                <a:latin typeface="TimesNewRomanPSMT"/>
+              </a:rPr>
+              <a:t>Targeted at mobile and enterprise computing applications including compute intensive 64-bit applications such as high end computer, tablet, and server products.</a:t>
+            </a:r>
+            <a:endParaRPr lang="en-US" sz="1400" dirty="0"/>
+          </a:p>
+        </p:txBody>
+      </p:sp>
+      <p:sp>
+        <p:nvSpPr>
+          <p:cNvPr id="11" name="Rectangle 10"/>
+          <p:cNvSpPr/>
+          <p:nvPr/>
+        </p:nvSpPr>
+        <p:spPr>
+          <a:xfrm>
+            <a:off x="4955930" y="2360098"/>
+            <a:ext cx="7063154" cy="523220"/>
+          </a:xfrm>
+          <a:prstGeom prst="rect">
+            <a:avLst/>
+          </a:prstGeom>
+        </p:spPr>
+        <p:txBody>
+          <a:bodyPr wrap="square">
+            <a:spAutoFit/>
+          </a:bodyPr>
+          <a:lstStyle/>
+          <a:p>
+            <a:r>
+              <a:rPr lang="en-US" sz="1400" dirty="0">
+                <a:latin typeface="TimesNewRomanPSMT"/>
+              </a:rPr>
+              <a:t>Inclusion of cryptography extensions improves performance on cryptography algorithms by 10 times over the previous generation of processors.</a:t>
+            </a:r>
+            <a:endParaRPr lang="en-US" sz="1400" dirty="0"/>
+          </a:p>
+        </p:txBody>
+      </p:sp>
+      <p:sp>
+        <p:nvSpPr>
+          <p:cNvPr id="12" name="Rectangle 11"/>
+          <p:cNvSpPr/>
+          <p:nvPr/>
+        </p:nvSpPr>
+        <p:spPr>
+          <a:xfrm>
+            <a:off x="4955930" y="1621434"/>
+            <a:ext cx="7063154" cy="523220"/>
+          </a:xfrm>
+          <a:prstGeom prst="rect">
+            <a:avLst/>
+          </a:prstGeom>
+        </p:spPr>
+        <p:txBody>
+          <a:bodyPr wrap="square">
+            <a:spAutoFit/>
+          </a:bodyPr>
+          <a:lstStyle/>
+          <a:p>
+            <a:r>
+              <a:rPr lang="en-US" sz="1400" dirty="0">
+                <a:latin typeface="TimesNewRomanPSMT"/>
+              </a:rPr>
+              <a:t>Features cache coherent interoperability with other processors, including the ARM Mali™ family of </a:t>
+            </a:r>
+            <a:r>
+              <a:rPr lang="en-US" sz="1400" i="1" dirty="0">
+                <a:latin typeface="TimesNewRomanPS-ItalicMT"/>
+              </a:rPr>
+              <a:t>Graphics Processing Units </a:t>
+            </a:r>
+            <a:r>
+              <a:rPr lang="en-US" sz="1400" dirty="0">
+                <a:latin typeface="TimesNewRomanPSMT"/>
+              </a:rPr>
+              <a:t>(GPUs) for GPU compute</a:t>
+            </a:r>
+            <a:endParaRPr lang="en-US" sz="1400" dirty="0"/>
+          </a:p>
+        </p:txBody>
+      </p:sp>
+      <p:sp>
+        <p:nvSpPr>
+          <p:cNvPr id="13" name="Rectangle 12"/>
+          <p:cNvSpPr/>
+          <p:nvPr/>
+        </p:nvSpPr>
+        <p:spPr>
+          <a:xfrm>
+            <a:off x="4955930" y="2964777"/>
+            <a:ext cx="7063154" cy="307777"/>
+          </a:xfrm>
+          <a:prstGeom prst="rect">
+            <a:avLst/>
+          </a:prstGeom>
+        </p:spPr>
+        <p:txBody>
+          <a:bodyPr wrap="square">
+            <a:spAutoFit/>
+          </a:bodyPr>
+          <a:lstStyle/>
+          <a:p>
+            <a:r>
+              <a:rPr lang="en-US" sz="1400" dirty="0">
+                <a:latin typeface="TimesNewRomanPSMT"/>
+              </a:rPr>
+              <a:t>Multi-core operation with one to four cores multi-processing within a single cluster.</a:t>
+            </a:r>
+            <a:endParaRPr lang="en-US" sz="1400" dirty="0"/>
+          </a:p>
+        </p:txBody>
+      </p:sp>
+      <p:sp>
+        <p:nvSpPr>
+          <p:cNvPr id="14" name="Rectangle 13"/>
+          <p:cNvSpPr/>
+          <p:nvPr/>
+        </p:nvSpPr>
+        <p:spPr>
+          <a:xfrm>
+            <a:off x="4955930" y="3603758"/>
+            <a:ext cx="7063154" cy="523220"/>
+          </a:xfrm>
+          <a:prstGeom prst="rect">
+            <a:avLst/>
+          </a:prstGeom>
+        </p:spPr>
+        <p:txBody>
+          <a:bodyPr wrap="square">
+            <a:spAutoFit/>
+          </a:bodyPr>
+          <a:lstStyle/>
+          <a:p>
+            <a:r>
+              <a:rPr lang="en-US" sz="1400" dirty="0">
+                <a:latin typeface="TimesNewRomanPSMT"/>
+              </a:rPr>
+              <a:t>Multiple coherent SMP clusters are possible, through AMBA5 CHI or AMBA 4 ACE technology.</a:t>
+            </a:r>
+            <a:endParaRPr lang="en-US" sz="1400" dirty="0"/>
+          </a:p>
+        </p:txBody>
+      </p:sp>
+      <p:sp>
+        <p:nvSpPr>
+          <p:cNvPr id="15" name="Rectangle 14"/>
+          <p:cNvSpPr/>
+          <p:nvPr/>
+        </p:nvSpPr>
+        <p:spPr>
+          <a:xfrm>
+            <a:off x="4955930" y="4027296"/>
+            <a:ext cx="7001608" cy="307777"/>
+          </a:xfrm>
+          <a:prstGeom prst="rect">
+            <a:avLst/>
+          </a:prstGeom>
+        </p:spPr>
+        <p:txBody>
+          <a:bodyPr wrap="square">
+            <a:spAutoFit/>
+          </a:bodyPr>
+          <a:lstStyle/>
+          <a:p>
+            <a:r>
+              <a:rPr lang="en-US" sz="1400" dirty="0">
+                <a:latin typeface="TimesNewRomanPSMT"/>
+              </a:rPr>
+              <a:t>Debug and trace are available through </a:t>
+            </a:r>
+            <a:r>
+              <a:rPr lang="en-US" sz="1400" dirty="0" err="1">
+                <a:latin typeface="TimesNewRomanPSMT"/>
+              </a:rPr>
+              <a:t>CoreSight</a:t>
+            </a:r>
+            <a:r>
+              <a:rPr lang="en-US" sz="1400" dirty="0">
+                <a:latin typeface="TimesNewRomanPSMT"/>
+              </a:rPr>
+              <a:t> technology</a:t>
+            </a:r>
+            <a:endParaRPr lang="en-US" sz="1400" dirty="0"/>
+          </a:p>
+        </p:txBody>
+      </p:sp>
+      <p:sp>
+        <p:nvSpPr>
+          <p:cNvPr id="16" name="Rectangle 15"/>
+          <p:cNvSpPr/>
+          <p:nvPr/>
+        </p:nvSpPr>
+        <p:spPr>
+          <a:xfrm>
+            <a:off x="4959745" y="4450834"/>
+            <a:ext cx="2501839" cy="307777"/>
+          </a:xfrm>
+          <a:prstGeom prst="rect">
+            <a:avLst/>
+          </a:prstGeom>
+        </p:spPr>
+        <p:txBody>
+          <a:bodyPr wrap="none">
+            <a:spAutoFit/>
+          </a:bodyPr>
+          <a:lstStyle/>
+          <a:p>
+            <a:r>
+              <a:rPr lang="en-US" sz="1400" dirty="0">
+                <a:latin typeface="TimesNewRomanPSMT"/>
+              </a:rPr>
+              <a:t>Out-of-order, 15+ stage pipeline</a:t>
+            </a:r>
+            <a:endParaRPr lang="en-US" sz="1400" dirty="0"/>
+          </a:p>
+        </p:txBody>
+      </p:sp>
+      <p:sp>
+        <p:nvSpPr>
+          <p:cNvPr id="17" name="Rectangle 16"/>
+          <p:cNvSpPr/>
+          <p:nvPr/>
+        </p:nvSpPr>
+        <p:spPr>
+          <a:xfrm>
+            <a:off x="4955930" y="4874372"/>
+            <a:ext cx="7063154" cy="1815882"/>
+          </a:xfrm>
+          <a:prstGeom prst="rect">
+            <a:avLst/>
+          </a:prstGeom>
+        </p:spPr>
+        <p:txBody>
+          <a:bodyPr wrap="square">
+            <a:spAutoFit/>
+          </a:bodyPr>
+          <a:lstStyle/>
+          <a:p>
+            <a:r>
+              <a:rPr lang="en-US" sz="1400" dirty="0">
+                <a:latin typeface="TimesNewRomanPSMT"/>
+              </a:rPr>
+              <a:t>Power-saving features include way-prediction, tag-reduction, and cache-lookup suppression.</a:t>
+            </a:r>
+          </a:p>
+          <a:p>
+            <a:endParaRPr lang="en-US" sz="1400" dirty="0">
+              <a:latin typeface="TimesNewRomanPSMT"/>
+            </a:endParaRPr>
+          </a:p>
+          <a:p>
+            <a:r>
+              <a:rPr lang="en-US" sz="1400" dirty="0">
+                <a:latin typeface="TimesNewRomanPSMT"/>
+              </a:rPr>
+              <a:t>Increased peak instruction throughput through duplication of execution resources.</a:t>
+            </a:r>
+          </a:p>
+          <a:p>
+            <a:endParaRPr lang="en-US" sz="1400" dirty="0">
+              <a:latin typeface="TimesNewRomanPSMT"/>
+            </a:endParaRPr>
+          </a:p>
+          <a:p>
+            <a:r>
+              <a:rPr lang="en-US" sz="1400" dirty="0">
+                <a:latin typeface="TimesNewRomanPSMT"/>
+              </a:rPr>
+              <a:t>Power-optimized instruction decode with localized decoding, 3-wide decode bandwidth.</a:t>
+            </a:r>
+          </a:p>
+          <a:p>
+            <a:endParaRPr lang="en-US" sz="1400" dirty="0">
+              <a:latin typeface="TimesNewRomanPSMT"/>
+            </a:endParaRPr>
+          </a:p>
+          <a:p>
+            <a:r>
+              <a:rPr lang="en-US" sz="1400" dirty="0">
+                <a:latin typeface="TimesNewRomanPSMT"/>
+              </a:rPr>
+              <a:t>Performance optimized L2 cache design enables more than one core in the cluster to access the L2 at the same time.</a:t>
+            </a:r>
+            <a:endParaRPr lang="en-US" sz="1400" dirty="0"/>
+          </a:p>
+        </p:txBody>
+      </p:sp>
+    </p:spTree>
+    <p:extLst>
+      <p:ext uri="{BB962C8B-B14F-4D97-AF65-F5344CB8AC3E}">
+        <p14:creationId xmlns:p14="http://schemas.microsoft.com/office/powerpoint/2010/main" val="811653449"/>
+      </p:ext>
+    </p:extLst>
+  </p:cSld>
+  <p:clrMapOvr>
+    <a:masterClrMapping/>
+  </p:clrMapOvr>
+</p:sld>
+</file>
+
+<file path=ppt/slides/slide9.xml><?xml version="1.0" encoding="utf-8"?>
+<p:sld xmlns:a="http://schemas.openxmlformats.org/drawingml/2006/main" xmlns:r="http://schemas.openxmlformats.org/officeDocument/2006/relationships" xmlns:p="http://schemas.openxmlformats.org/presentationml/2006/main">
+  <p:cSld>
+    <p:spTree>
+      <p:nvGrpSpPr>
+        <p:cNvPr id="1" name=""/>
+        <p:cNvGrpSpPr/>
+        <p:nvPr/>
+      </p:nvGrpSpPr>
+      <p:grpSpPr>
+        <a:xfrm>
+          <a:off x="0" y="0"/>
+          <a:ext cx="0" cy="0"/>
+          <a:chOff x="0" y="0"/>
+          <a:chExt cx="0" cy="0"/>
+        </a:xfrm>
+      </p:grpSpPr>
+      <p:sp>
+        <p:nvSpPr>
+          <p:cNvPr id="4" name="Rectangle 3"/>
+          <p:cNvSpPr/>
+          <p:nvPr/>
+        </p:nvSpPr>
+        <p:spPr>
+          <a:xfrm>
+            <a:off x="265286" y="316496"/>
+            <a:ext cx="9010599" cy="369332"/>
+          </a:xfrm>
+          <a:prstGeom prst="rect">
+            <a:avLst/>
+          </a:prstGeom>
+        </p:spPr>
+        <p:txBody>
+          <a:bodyPr wrap="square">
+            <a:spAutoFit/>
+          </a:bodyPr>
+          <a:lstStyle/>
+          <a:p>
+            <a:r>
+              <a:rPr lang="en-US" b="1" dirty="0">
+                <a:latin typeface="Arial-BoldMT"/>
+              </a:rPr>
+              <a:t>ARMv8 Processors</a:t>
+            </a:r>
+            <a:endParaRPr lang="en-US" dirty="0"/>
+          </a:p>
+        </p:txBody>
+      </p:sp>
+      <p:sp>
+        <p:nvSpPr>
+          <p:cNvPr id="6" name="Rectangle 5"/>
+          <p:cNvSpPr/>
+          <p:nvPr/>
+        </p:nvSpPr>
+        <p:spPr>
+          <a:xfrm>
+            <a:off x="3169781" y="316496"/>
+            <a:ext cx="3621504" cy="369332"/>
+          </a:xfrm>
+          <a:prstGeom prst="rect">
+            <a:avLst/>
+          </a:prstGeom>
+        </p:spPr>
+        <p:txBody>
+          <a:bodyPr wrap="none">
+            <a:spAutoFit/>
+          </a:bodyPr>
+          <a:lstStyle/>
+          <a:p>
+            <a:r>
+              <a:rPr lang="en-US" b="1" dirty="0">
+                <a:latin typeface="Arial-BoldMT"/>
+              </a:rPr>
+              <a:t>Cortex-A72 processor (LS1028)</a:t>
+            </a:r>
+            <a:endParaRPr lang="en-US" dirty="0"/>
+          </a:p>
+        </p:txBody>
+      </p:sp>
+      <p:grpSp>
+        <p:nvGrpSpPr>
+          <p:cNvPr id="8" name="Group 7"/>
+          <p:cNvGrpSpPr/>
+          <p:nvPr/>
+        </p:nvGrpSpPr>
+        <p:grpSpPr>
+          <a:xfrm>
+            <a:off x="153652" y="2156444"/>
+            <a:ext cx="5127593" cy="4457698"/>
+            <a:chOff x="1292469" y="1020395"/>
+            <a:chExt cx="7713909" cy="5774848"/>
+          </a:xfrm>
+        </p:grpSpPr>
+        <p:pic>
+          <p:nvPicPr>
+            <p:cNvPr id="7" name="Picture 6"/>
+            <p:cNvPicPr>
+              <a:picLocks noChangeAspect="1"/>
+            </p:cNvPicPr>
+            <p:nvPr/>
+          </p:nvPicPr>
+          <p:blipFill>
+            <a:blip r:embed="rId2"/>
+            <a:stretch>
+              <a:fillRect/>
+            </a:stretch>
+          </p:blipFill>
+          <p:spPr>
+            <a:xfrm>
+              <a:off x="1292469" y="1020395"/>
+              <a:ext cx="7713909" cy="5644174"/>
+            </a:xfrm>
+            <a:prstGeom prst="rect">
+              <a:avLst/>
+            </a:prstGeom>
+          </p:spPr>
+        </p:pic>
+        <p:pic>
+          <p:nvPicPr>
+            <p:cNvPr id="2" name="Picture 1"/>
+            <p:cNvPicPr>
+              <a:picLocks noChangeAspect="1"/>
+            </p:cNvPicPr>
+            <p:nvPr/>
+          </p:nvPicPr>
+          <p:blipFill>
+            <a:blip r:embed="rId3"/>
+            <a:stretch>
+              <a:fillRect/>
+            </a:stretch>
+          </p:blipFill>
+          <p:spPr>
+            <a:xfrm>
+              <a:off x="3495034" y="6533895"/>
+              <a:ext cx="3308777" cy="261348"/>
+            </a:xfrm>
+            <a:prstGeom prst="rect">
+              <a:avLst/>
+            </a:prstGeom>
+          </p:spPr>
+        </p:pic>
+      </p:grpSp>
+      <p:sp>
+        <p:nvSpPr>
+          <p:cNvPr id="9" name="Rectangle 8"/>
+          <p:cNvSpPr/>
+          <p:nvPr/>
+        </p:nvSpPr>
+        <p:spPr>
+          <a:xfrm>
+            <a:off x="5281246" y="1041701"/>
+            <a:ext cx="6781799" cy="307777"/>
+          </a:xfrm>
+          <a:prstGeom prst="rect">
+            <a:avLst/>
+          </a:prstGeom>
+        </p:spPr>
+        <p:txBody>
+          <a:bodyPr wrap="square">
+            <a:spAutoFit/>
+          </a:bodyPr>
+          <a:lstStyle/>
+          <a:p>
+            <a:r>
+              <a:rPr lang="en-US" sz="1400" dirty="0">
+                <a:latin typeface="TimesNewRomanPSMT"/>
+              </a:rPr>
+              <a:t>Has one to four cores in a single processor device with L1 and L2 cache subsystems</a:t>
+            </a:r>
+            <a:endParaRPr lang="en-US" sz="1400" dirty="0"/>
+          </a:p>
+        </p:txBody>
+      </p:sp>
+      <p:sp>
+        <p:nvSpPr>
+          <p:cNvPr id="10" name="Rectangle 9"/>
+          <p:cNvSpPr/>
+          <p:nvPr/>
+        </p:nvSpPr>
+        <p:spPr>
+          <a:xfrm>
+            <a:off x="5281246" y="709876"/>
+            <a:ext cx="6781799" cy="307777"/>
+          </a:xfrm>
+          <a:prstGeom prst="rect">
+            <a:avLst/>
+          </a:prstGeom>
+        </p:spPr>
+        <p:txBody>
+          <a:bodyPr wrap="square">
+            <a:spAutoFit/>
+          </a:bodyPr>
+          <a:lstStyle/>
+          <a:p>
+            <a:r>
+              <a:rPr lang="en-US" sz="1400" dirty="0">
+                <a:latin typeface="TimesNewRomanPSMT"/>
+              </a:rPr>
+              <a:t>High-performance, low-power processor that implements the ARMv8-A architecture</a:t>
+            </a:r>
+            <a:endParaRPr lang="en-US" sz="1400" dirty="0"/>
+          </a:p>
+        </p:txBody>
+      </p:sp>
+      <p:sp>
+        <p:nvSpPr>
+          <p:cNvPr id="11" name="Rectangle 10"/>
+          <p:cNvSpPr/>
+          <p:nvPr/>
+        </p:nvSpPr>
+        <p:spPr>
+          <a:xfrm>
+            <a:off x="5281245" y="1373526"/>
+            <a:ext cx="4343946" cy="307777"/>
+          </a:xfrm>
+          <a:prstGeom prst="rect">
+            <a:avLst/>
+          </a:prstGeom>
+        </p:spPr>
+        <p:txBody>
+          <a:bodyPr wrap="none">
+            <a:spAutoFit/>
+          </a:bodyPr>
+          <a:lstStyle/>
+          <a:p>
+            <a:r>
+              <a:rPr lang="en-US" sz="1400" dirty="0">
+                <a:latin typeface="TimesNewRomanPSMT"/>
+              </a:rPr>
+              <a:t>Support for both AArch32 and AArch64 Execution states.</a:t>
+            </a:r>
+            <a:endParaRPr lang="en-US" sz="1400" dirty="0"/>
+          </a:p>
+        </p:txBody>
+      </p:sp>
+      <p:sp>
+        <p:nvSpPr>
+          <p:cNvPr id="12" name="Rectangle 11"/>
+          <p:cNvSpPr/>
+          <p:nvPr/>
+        </p:nvSpPr>
+        <p:spPr>
+          <a:xfrm>
+            <a:off x="5281244" y="1705351"/>
+            <a:ext cx="8047892" cy="307777"/>
+          </a:xfrm>
+          <a:prstGeom prst="rect">
+            <a:avLst/>
+          </a:prstGeom>
+        </p:spPr>
+        <p:txBody>
+          <a:bodyPr wrap="square">
+            <a:spAutoFit/>
+          </a:bodyPr>
+          <a:lstStyle/>
+          <a:p>
+            <a:r>
+              <a:rPr lang="en-US" sz="1400" dirty="0">
+                <a:latin typeface="TimesNewRomanPSMT"/>
+              </a:rPr>
+              <a:t>Support for all Exception levels, EL0, EL1, EL2, and EL3, in each Execution state.</a:t>
+            </a:r>
+            <a:endParaRPr lang="en-US" sz="1400" dirty="0"/>
+          </a:p>
+        </p:txBody>
+      </p:sp>
+      <p:sp>
+        <p:nvSpPr>
+          <p:cNvPr id="13" name="Rectangle 12"/>
+          <p:cNvSpPr/>
+          <p:nvPr/>
+        </p:nvSpPr>
+        <p:spPr>
+          <a:xfrm>
+            <a:off x="5281245" y="2116050"/>
+            <a:ext cx="6910755" cy="1169551"/>
+          </a:xfrm>
+          <a:prstGeom prst="rect">
+            <a:avLst/>
+          </a:prstGeom>
+        </p:spPr>
+        <p:txBody>
+          <a:bodyPr wrap="square">
+            <a:spAutoFit/>
+          </a:bodyPr>
+          <a:lstStyle/>
+          <a:p>
+            <a:r>
+              <a:rPr lang="en-US" sz="1400" dirty="0">
+                <a:latin typeface="TimesNewRomanPSMT"/>
+              </a:rPr>
+              <a:t>A32 instruction set, previously called the ARM instruction set.</a:t>
+            </a:r>
+          </a:p>
+          <a:p>
+            <a:endParaRPr lang="en-US" sz="1400" dirty="0">
+              <a:latin typeface="TimesNewRomanPSMT"/>
+            </a:endParaRPr>
+          </a:p>
+          <a:p>
+            <a:r>
+              <a:rPr lang="en-US" sz="1400" dirty="0">
+                <a:latin typeface="TimesNewRomanPSMT"/>
+              </a:rPr>
+              <a:t>T32 instruction set, previously called the Thumb instruction set.</a:t>
+            </a:r>
+          </a:p>
+          <a:p>
+            <a:endParaRPr lang="en-US" sz="1400" dirty="0">
+              <a:latin typeface="TimesNewRomanPSMT"/>
+            </a:endParaRPr>
+          </a:p>
+          <a:p>
+            <a:r>
+              <a:rPr lang="en-US" sz="1400" dirty="0">
+                <a:latin typeface="TimesNewRomanPSMT"/>
+              </a:rPr>
+              <a:t>A64 instruction set.</a:t>
+            </a:r>
+            <a:endParaRPr lang="en-US" sz="1400" dirty="0"/>
+          </a:p>
+        </p:txBody>
+      </p:sp>
+      <p:sp>
+        <p:nvSpPr>
+          <p:cNvPr id="14" name="Rectangle 13"/>
+          <p:cNvSpPr/>
+          <p:nvPr/>
+        </p:nvSpPr>
+        <p:spPr>
+          <a:xfrm>
+            <a:off x="5281244" y="3372278"/>
+            <a:ext cx="4703532" cy="307777"/>
+          </a:xfrm>
+          <a:prstGeom prst="rect">
+            <a:avLst/>
+          </a:prstGeom>
+        </p:spPr>
+        <p:txBody>
+          <a:bodyPr wrap="none">
+            <a:spAutoFit/>
+          </a:bodyPr>
+          <a:lstStyle/>
+          <a:p>
+            <a:r>
+              <a:rPr lang="en-US" sz="1400" dirty="0">
+                <a:latin typeface="TimesNewRomanPSMT"/>
+              </a:rPr>
+              <a:t>Advanced </a:t>
+            </a:r>
+            <a:r>
+              <a:rPr lang="en-US" sz="1400" i="1" dirty="0">
+                <a:latin typeface="TimesNewRomanPS-ItalicMT"/>
+              </a:rPr>
+              <a:t>Single Instruction Multiple Data </a:t>
+            </a:r>
+            <a:r>
+              <a:rPr lang="en-US" sz="1400" dirty="0">
+                <a:latin typeface="TimesNewRomanPSMT"/>
+              </a:rPr>
+              <a:t>(SIMD) operations</a:t>
+            </a:r>
+            <a:endParaRPr lang="en-US" sz="1400" dirty="0"/>
+          </a:p>
+        </p:txBody>
+      </p:sp>
+      <p:sp>
+        <p:nvSpPr>
+          <p:cNvPr id="15" name="Rectangle 14"/>
+          <p:cNvSpPr/>
+          <p:nvPr/>
+        </p:nvSpPr>
+        <p:spPr>
+          <a:xfrm>
+            <a:off x="5281244" y="4092567"/>
+            <a:ext cx="6096000" cy="307777"/>
+          </a:xfrm>
+          <a:prstGeom prst="rect">
+            <a:avLst/>
+          </a:prstGeom>
+        </p:spPr>
+        <p:txBody>
+          <a:bodyPr>
+            <a:spAutoFit/>
+          </a:bodyPr>
+          <a:lstStyle/>
+          <a:p>
+            <a:r>
+              <a:rPr lang="en-US" sz="1400" dirty="0">
+                <a:solidFill>
+                  <a:srgbClr val="FF0000"/>
+                </a:solidFill>
+                <a:latin typeface="TimesNewRomanPSMT"/>
+              </a:rPr>
+              <a:t>Cortex-A72 processor does not support the T32EE (</a:t>
+            </a:r>
+            <a:r>
+              <a:rPr lang="en-US" sz="1400" dirty="0" err="1">
+                <a:solidFill>
+                  <a:srgbClr val="FF0000"/>
+                </a:solidFill>
+                <a:latin typeface="TimesNewRomanPSMT"/>
+              </a:rPr>
+              <a:t>ThumbEE</a:t>
+            </a:r>
+            <a:r>
+              <a:rPr lang="en-US" sz="1400" dirty="0">
+                <a:solidFill>
+                  <a:srgbClr val="FF0000"/>
+                </a:solidFill>
+                <a:latin typeface="TimesNewRomanPSMT"/>
+              </a:rPr>
+              <a:t>) instruction set.</a:t>
+            </a:r>
+            <a:endParaRPr lang="en-US" sz="1400" dirty="0">
+              <a:solidFill>
+                <a:srgbClr val="FF0000"/>
+              </a:solidFill>
+            </a:endParaRPr>
+          </a:p>
+        </p:txBody>
+      </p:sp>
+      <p:sp>
+        <p:nvSpPr>
+          <p:cNvPr id="19" name="Rectangle 18"/>
+          <p:cNvSpPr/>
+          <p:nvPr/>
+        </p:nvSpPr>
+        <p:spPr>
+          <a:xfrm>
+            <a:off x="6825761" y="4422029"/>
+            <a:ext cx="4815254" cy="430887"/>
+          </a:xfrm>
+          <a:prstGeom prst="rect">
+            <a:avLst/>
+          </a:prstGeom>
+        </p:spPr>
+        <p:txBody>
+          <a:bodyPr wrap="square">
+            <a:spAutoFit/>
+          </a:bodyPr>
+          <a:lstStyle/>
+          <a:p>
+            <a:r>
+              <a:rPr lang="en-US" sz="1100" dirty="0">
+                <a:solidFill>
+                  <a:srgbClr val="FF0000"/>
+                </a:solidFill>
+                <a:latin typeface="TimesNewRomanPSMT"/>
+              </a:rPr>
+              <a:t>The </a:t>
+            </a:r>
+            <a:r>
+              <a:rPr lang="en-US" sz="1100" i="1" dirty="0">
+                <a:solidFill>
+                  <a:srgbClr val="FF0000"/>
+                </a:solidFill>
+                <a:latin typeface="TimesNewRomanPS-ItalicMT"/>
+              </a:rPr>
+              <a:t>Thumb Execution Environment </a:t>
+            </a:r>
+            <a:r>
+              <a:rPr lang="en-US" sz="1100" dirty="0">
+                <a:solidFill>
+                  <a:srgbClr val="FF0000"/>
+                </a:solidFill>
+                <a:latin typeface="TimesNewRomanPSMT"/>
+              </a:rPr>
+              <a:t>(</a:t>
+            </a:r>
+            <a:r>
+              <a:rPr lang="en-US" sz="1100" dirty="0" err="1">
+                <a:solidFill>
+                  <a:srgbClr val="FF0000"/>
+                </a:solidFill>
+                <a:latin typeface="TimesNewRomanPSMT"/>
+              </a:rPr>
+              <a:t>ThumbEE</a:t>
+            </a:r>
+            <a:r>
+              <a:rPr lang="en-US" sz="1100" dirty="0">
+                <a:solidFill>
+                  <a:srgbClr val="FF0000"/>
+                </a:solidFill>
+                <a:latin typeface="TimesNewRomanPSMT"/>
+              </a:rPr>
+              <a:t>) extension is a variant of the Thumb instruction set that is designed as a target for dynamically generated code.</a:t>
+            </a:r>
+            <a:endParaRPr lang="en-US" sz="1100" dirty="0">
+              <a:solidFill>
+                <a:srgbClr val="FF0000"/>
+              </a:solidFill>
+            </a:endParaRPr>
+          </a:p>
+        </p:txBody>
+      </p:sp>
+    </p:spTree>
+    <p:extLst>
+      <p:ext uri="{BB962C8B-B14F-4D97-AF65-F5344CB8AC3E}">
+        <p14:creationId xmlns:p14="http://schemas.microsoft.com/office/powerpoint/2010/main" val="3996238191"/>
       </p:ext>
     </p:extLst>
   </p:cSld>

</xml_diff>

<commit_message>
Renamed Presentations/ARM_PPTs/Ch3_ARMv8_Fundamentals_n_Arch.pptx  to   Presentations/ARM_PPTs/Ch3_ARMv8_Fundamentals_n_EL.pptx
</commit_message>
<xml_diff>
--- a/Presentations/ARM_PPTs/Ch2_ARMv8_Architecture.pptx
+++ b/Presentations/ARM_PPTs/Ch2_ARMv8_Architecture.pptx
@@ -843,7 +843,7 @@
             <a:fld id="{B61BEF0D-F0BB-DE4B-95CE-6DB70DBA9567}" type="datetimeFigureOut">
               <a:rPr lang="en-US" dirty="0"/>
               <a:pPr/>
-              <a:t>6/3/2017</a:t>
+              <a:t>6/8/2017</a:t>
             </a:fld>
             <a:endParaRPr lang="en-US" dirty="0"/>
           </a:p>
@@ -1091,7 +1091,7 @@
             <a:fld id="{B61BEF0D-F0BB-DE4B-95CE-6DB70DBA9567}" type="datetimeFigureOut">
               <a:rPr lang="en-US" dirty="0"/>
               <a:pPr/>
-              <a:t>6/3/2017</a:t>
+              <a:t>6/8/2017</a:t>
             </a:fld>
             <a:endParaRPr lang="en-US" dirty="0"/>
           </a:p>
@@ -1402,7 +1402,7 @@
             <a:fld id="{B61BEF0D-F0BB-DE4B-95CE-6DB70DBA9567}" type="datetimeFigureOut">
               <a:rPr lang="en-US" dirty="0"/>
               <a:pPr/>
-              <a:t>6/3/2017</a:t>
+              <a:t>6/8/2017</a:t>
             </a:fld>
             <a:endParaRPr lang="en-US" dirty="0"/>
           </a:p>
@@ -1740,7 +1740,7 @@
             <a:fld id="{B61BEF0D-F0BB-DE4B-95CE-6DB70DBA9567}" type="datetimeFigureOut">
               <a:rPr lang="en-US" dirty="0"/>
               <a:pPr/>
-              <a:t>6/3/2017</a:t>
+              <a:t>6/8/2017</a:t>
             </a:fld>
             <a:endParaRPr lang="en-US" dirty="0"/>
           </a:p>
@@ -2051,7 +2051,7 @@
             <a:fld id="{B61BEF0D-F0BB-DE4B-95CE-6DB70DBA9567}" type="datetimeFigureOut">
               <a:rPr lang="en-US" dirty="0"/>
               <a:pPr/>
-              <a:t>6/3/2017</a:t>
+              <a:t>6/8/2017</a:t>
             </a:fld>
             <a:endParaRPr lang="en-US" dirty="0"/>
           </a:p>
@@ -2441,7 +2441,7 @@
             <a:fld id="{B61BEF0D-F0BB-DE4B-95CE-6DB70DBA9567}" type="datetimeFigureOut">
               <a:rPr lang="en-US" dirty="0"/>
               <a:pPr/>
-              <a:t>6/3/2017</a:t>
+              <a:t>6/8/2017</a:t>
             </a:fld>
             <a:endParaRPr lang="en-US" dirty="0"/>
           </a:p>
@@ -2607,7 +2607,7 @@
           <a:p>
             <a:fld id="{55C6B4A9-1611-4792-9094-5F34BCA07E0B}" type="datetimeFigureOut">
               <a:rPr lang="en-US" dirty="0"/>
-              <a:t>6/3/2017</a:t>
+              <a:t>6/8/2017</a:t>
             </a:fld>
             <a:endParaRPr lang="en-US" dirty="0"/>
           </a:p>
@@ -2783,7 +2783,7 @@
             <a:fld id="{B61BEF0D-F0BB-DE4B-95CE-6DB70DBA9567}" type="datetimeFigureOut">
               <a:rPr lang="en-US" dirty="0"/>
               <a:pPr/>
-              <a:t>6/3/2017</a:t>
+              <a:t>6/8/2017</a:t>
             </a:fld>
             <a:endParaRPr lang="en-US" dirty="0"/>
           </a:p>
@@ -2956,7 +2956,7 @@
             <a:fld id="{B61BEF0D-F0BB-DE4B-95CE-6DB70DBA9567}" type="datetimeFigureOut">
               <a:rPr lang="en-US" dirty="0"/>
               <a:pPr/>
-              <a:t>6/3/2017</a:t>
+              <a:t>6/8/2017</a:t>
             </a:fld>
             <a:endParaRPr lang="en-US" dirty="0"/>
           </a:p>
@@ -3200,7 +3200,7 @@
             <a:fld id="{B61BEF0D-F0BB-DE4B-95CE-6DB70DBA9567}" type="datetimeFigureOut">
               <a:rPr lang="en-US" dirty="0"/>
               <a:pPr/>
-              <a:t>6/3/2017</a:t>
+              <a:t>6/8/2017</a:t>
             </a:fld>
             <a:endParaRPr lang="en-US" dirty="0"/>
           </a:p>
@@ -3428,7 +3428,7 @@
           <a:p>
             <a:fld id="{EB712588-04B1-427B-82EE-E8DB90309F08}" type="datetimeFigureOut">
               <a:rPr lang="en-US" dirty="0"/>
-              <a:t>6/3/2017</a:t>
+              <a:t>6/8/2017</a:t>
             </a:fld>
             <a:endParaRPr lang="en-US" dirty="0"/>
           </a:p>
@@ -3798,7 +3798,7 @@
             <a:fld id="{B61BEF0D-F0BB-DE4B-95CE-6DB70DBA9567}" type="datetimeFigureOut">
               <a:rPr lang="en-US" dirty="0"/>
               <a:pPr/>
-              <a:t>6/3/2017</a:t>
+              <a:t>6/8/2017</a:t>
             </a:fld>
             <a:endParaRPr lang="en-US" dirty="0"/>
           </a:p>
@@ -3918,7 +3918,7 @@
             <a:fld id="{B61BEF0D-F0BB-DE4B-95CE-6DB70DBA9567}" type="datetimeFigureOut">
               <a:rPr lang="en-US" dirty="0"/>
               <a:pPr/>
-              <a:t>6/3/2017</a:t>
+              <a:t>6/8/2017</a:t>
             </a:fld>
             <a:endParaRPr lang="en-US" dirty="0"/>
           </a:p>
@@ -4010,7 +4010,7 @@
             <a:fld id="{B61BEF0D-F0BB-DE4B-95CE-6DB70DBA9567}" type="datetimeFigureOut">
               <a:rPr lang="en-US" dirty="0"/>
               <a:pPr/>
-              <a:t>6/3/2017</a:t>
+              <a:t>6/8/2017</a:t>
             </a:fld>
             <a:endParaRPr lang="en-US" dirty="0"/>
           </a:p>
@@ -4261,7 +4261,7 @@
           <a:p>
             <a:fld id="{42A54C80-263E-416B-A8E0-580EDEADCBDC}" type="datetimeFigureOut">
               <a:rPr lang="en-US" dirty="0"/>
-              <a:t>6/3/2017</a:t>
+              <a:t>6/8/2017</a:t>
             </a:fld>
             <a:endParaRPr lang="en-US" dirty="0"/>
           </a:p>
@@ -4520,7 +4520,7 @@
             <a:fld id="{B61BEF0D-F0BB-DE4B-95CE-6DB70DBA9567}" type="datetimeFigureOut">
               <a:rPr lang="en-US" dirty="0"/>
               <a:pPr/>
-              <a:t>6/3/2017</a:t>
+              <a:t>6/8/2017</a:t>
             </a:fld>
             <a:endParaRPr lang="en-US" dirty="0"/>
           </a:p>
@@ -5260,7 +5260,7 @@
             <a:fld id="{B61BEF0D-F0BB-DE4B-95CE-6DB70DBA9567}" type="datetimeFigureOut">
               <a:rPr lang="en-US" dirty="0"/>
               <a:pPr/>
-              <a:t>6/3/2017</a:t>
+              <a:t>6/8/2017</a:t>
             </a:fld>
             <a:endParaRPr lang="en-US" dirty="0"/>
           </a:p>
@@ -8245,11 +8245,18 @@
         </p:nvGrpSpPr>
         <p:grpSpPr>
           <a:xfrm>
-            <a:off x="153652" y="2156444"/>
+            <a:off x="153651" y="2323292"/>
             <a:ext cx="5127593" cy="4457698"/>
             <a:chOff x="1292469" y="1020395"/>
             <a:chExt cx="7713909" cy="5774848"/>
           </a:xfrm>
+          <a:effectLst>
+            <a:outerShdw blurRad="63500" sx="102000" sy="102000" algn="ctr" rotWithShape="0">
+              <a:prstClr val="black">
+                <a:alpha val="40000"/>
+              </a:prstClr>
+            </a:outerShdw>
+          </a:effectLst>
         </p:grpSpPr>
         <p:pic>
           <p:nvPicPr>

</xml_diff>

<commit_message>
Added new ebook - Learning Linux
</commit_message>
<xml_diff>
--- a/Presentations/ARM_PPTs/Ch2_ARMv8_Architecture.pptx
+++ b/Presentations/ARM_PPTs/Ch2_ARMv8_Architecture.pptx
@@ -843,7 +843,7 @@
             <a:fld id="{B61BEF0D-F0BB-DE4B-95CE-6DB70DBA9567}" type="datetimeFigureOut">
               <a:rPr lang="en-US" dirty="0"/>
               <a:pPr/>
-              <a:t>6/8/2017</a:t>
+              <a:t>6/9/2017</a:t>
             </a:fld>
             <a:endParaRPr lang="en-US" dirty="0"/>
           </a:p>
@@ -1091,7 +1091,7 @@
             <a:fld id="{B61BEF0D-F0BB-DE4B-95CE-6DB70DBA9567}" type="datetimeFigureOut">
               <a:rPr lang="en-US" dirty="0"/>
               <a:pPr/>
-              <a:t>6/8/2017</a:t>
+              <a:t>6/9/2017</a:t>
             </a:fld>
             <a:endParaRPr lang="en-US" dirty="0"/>
           </a:p>
@@ -1402,7 +1402,7 @@
             <a:fld id="{B61BEF0D-F0BB-DE4B-95CE-6DB70DBA9567}" type="datetimeFigureOut">
               <a:rPr lang="en-US" dirty="0"/>
               <a:pPr/>
-              <a:t>6/8/2017</a:t>
+              <a:t>6/9/2017</a:t>
             </a:fld>
             <a:endParaRPr lang="en-US" dirty="0"/>
           </a:p>
@@ -1740,7 +1740,7 @@
             <a:fld id="{B61BEF0D-F0BB-DE4B-95CE-6DB70DBA9567}" type="datetimeFigureOut">
               <a:rPr lang="en-US" dirty="0"/>
               <a:pPr/>
-              <a:t>6/8/2017</a:t>
+              <a:t>6/9/2017</a:t>
             </a:fld>
             <a:endParaRPr lang="en-US" dirty="0"/>
           </a:p>
@@ -2051,7 +2051,7 @@
             <a:fld id="{B61BEF0D-F0BB-DE4B-95CE-6DB70DBA9567}" type="datetimeFigureOut">
               <a:rPr lang="en-US" dirty="0"/>
               <a:pPr/>
-              <a:t>6/8/2017</a:t>
+              <a:t>6/9/2017</a:t>
             </a:fld>
             <a:endParaRPr lang="en-US" dirty="0"/>
           </a:p>
@@ -2441,7 +2441,7 @@
             <a:fld id="{B61BEF0D-F0BB-DE4B-95CE-6DB70DBA9567}" type="datetimeFigureOut">
               <a:rPr lang="en-US" dirty="0"/>
               <a:pPr/>
-              <a:t>6/8/2017</a:t>
+              <a:t>6/9/2017</a:t>
             </a:fld>
             <a:endParaRPr lang="en-US" dirty="0"/>
           </a:p>
@@ -2607,7 +2607,7 @@
           <a:p>
             <a:fld id="{55C6B4A9-1611-4792-9094-5F34BCA07E0B}" type="datetimeFigureOut">
               <a:rPr lang="en-US" dirty="0"/>
-              <a:t>6/8/2017</a:t>
+              <a:t>6/9/2017</a:t>
             </a:fld>
             <a:endParaRPr lang="en-US" dirty="0"/>
           </a:p>
@@ -2783,7 +2783,7 @@
             <a:fld id="{B61BEF0D-F0BB-DE4B-95CE-6DB70DBA9567}" type="datetimeFigureOut">
               <a:rPr lang="en-US" dirty="0"/>
               <a:pPr/>
-              <a:t>6/8/2017</a:t>
+              <a:t>6/9/2017</a:t>
             </a:fld>
             <a:endParaRPr lang="en-US" dirty="0"/>
           </a:p>
@@ -2956,7 +2956,7 @@
             <a:fld id="{B61BEF0D-F0BB-DE4B-95CE-6DB70DBA9567}" type="datetimeFigureOut">
               <a:rPr lang="en-US" dirty="0"/>
               <a:pPr/>
-              <a:t>6/8/2017</a:t>
+              <a:t>6/9/2017</a:t>
             </a:fld>
             <a:endParaRPr lang="en-US" dirty="0"/>
           </a:p>
@@ -3200,7 +3200,7 @@
             <a:fld id="{B61BEF0D-F0BB-DE4B-95CE-6DB70DBA9567}" type="datetimeFigureOut">
               <a:rPr lang="en-US" dirty="0"/>
               <a:pPr/>
-              <a:t>6/8/2017</a:t>
+              <a:t>6/9/2017</a:t>
             </a:fld>
             <a:endParaRPr lang="en-US" dirty="0"/>
           </a:p>
@@ -3428,7 +3428,7 @@
           <a:p>
             <a:fld id="{EB712588-04B1-427B-82EE-E8DB90309F08}" type="datetimeFigureOut">
               <a:rPr lang="en-US" dirty="0"/>
-              <a:t>6/8/2017</a:t>
+              <a:t>6/9/2017</a:t>
             </a:fld>
             <a:endParaRPr lang="en-US" dirty="0"/>
           </a:p>
@@ -3798,7 +3798,7 @@
             <a:fld id="{B61BEF0D-F0BB-DE4B-95CE-6DB70DBA9567}" type="datetimeFigureOut">
               <a:rPr lang="en-US" dirty="0"/>
               <a:pPr/>
-              <a:t>6/8/2017</a:t>
+              <a:t>6/9/2017</a:t>
             </a:fld>
             <a:endParaRPr lang="en-US" dirty="0"/>
           </a:p>
@@ -3918,7 +3918,7 @@
             <a:fld id="{B61BEF0D-F0BB-DE4B-95CE-6DB70DBA9567}" type="datetimeFigureOut">
               <a:rPr lang="en-US" dirty="0"/>
               <a:pPr/>
-              <a:t>6/8/2017</a:t>
+              <a:t>6/9/2017</a:t>
             </a:fld>
             <a:endParaRPr lang="en-US" dirty="0"/>
           </a:p>
@@ -4010,7 +4010,7 @@
             <a:fld id="{B61BEF0D-F0BB-DE4B-95CE-6DB70DBA9567}" type="datetimeFigureOut">
               <a:rPr lang="en-US" dirty="0"/>
               <a:pPr/>
-              <a:t>6/8/2017</a:t>
+              <a:t>6/9/2017</a:t>
             </a:fld>
             <a:endParaRPr lang="en-US" dirty="0"/>
           </a:p>
@@ -4261,7 +4261,7 @@
           <a:p>
             <a:fld id="{42A54C80-263E-416B-A8E0-580EDEADCBDC}" type="datetimeFigureOut">
               <a:rPr lang="en-US" dirty="0"/>
-              <a:t>6/8/2017</a:t>
+              <a:t>6/9/2017</a:t>
             </a:fld>
             <a:endParaRPr lang="en-US" dirty="0"/>
           </a:p>
@@ -4520,7 +4520,7 @@
             <a:fld id="{B61BEF0D-F0BB-DE4B-95CE-6DB70DBA9567}" type="datetimeFigureOut">
               <a:rPr lang="en-US" dirty="0"/>
               <a:pPr/>
-              <a:t>6/8/2017</a:t>
+              <a:t>6/9/2017</a:t>
             </a:fld>
             <a:endParaRPr lang="en-US" dirty="0"/>
           </a:p>
@@ -5260,7 +5260,7 @@
             <a:fld id="{B61BEF0D-F0BB-DE4B-95CE-6DB70DBA9567}" type="datetimeFigureOut">
               <a:rPr lang="en-US" dirty="0"/>
               <a:pPr/>
-              <a:t>6/8/2017</a:t>
+              <a:t>6/9/2017</a:t>
             </a:fld>
             <a:endParaRPr lang="en-US" dirty="0"/>
           </a:p>
@@ -5954,13 +5954,13 @@
           <p:nvPr>
             <p:extLst>
               <p:ext uri="{D42A27DB-BD31-4B8C-83A1-F6EECF244321}">
-                <p14:modId xmlns:p14="http://schemas.microsoft.com/office/powerpoint/2010/main" val="2581035974"/>
+                <p14:modId xmlns:p14="http://schemas.microsoft.com/office/powerpoint/2010/main" val="1268997194"/>
               </p:ext>
             </p:extLst>
           </p:nvPr>
         </p:nvGraphicFramePr>
         <p:xfrm>
-          <a:off x="265286" y="1380420"/>
+          <a:off x="815702" y="1380420"/>
           <a:ext cx="8674808" cy="4739026"/>
         </p:xfrm>
         <a:graphic>
@@ -6052,15 +6052,15 @@
                         <a:buChar char="•"/>
                       </a:pPr>
                       <a:r>
-                        <a:rPr lang="en-US" sz="1200" b="0" i="0" u="none" strike="noStrike" kern="1200" baseline="0" dirty="0">
+                        <a:rPr lang="en-US" sz="1200" b="1" i="0" u="none" strike="noStrike" kern="1200" baseline="0" dirty="0">
                           <a:solidFill>
-                            <a:schemeClr val="dk1"/>
+                            <a:schemeClr val="accent2"/>
                           </a:solidFill>
                           <a:latin typeface="Corbel" panose="020B0503020204020204" pitchFamily="34" charset="0"/>
                           <a:ea typeface="+mn-ea"/>
                           <a:cs typeface="+mn-cs"/>
                         </a:rPr>
-                        <a:t>Used only the ARM 32-bit instruction set</a:t>
+                        <a:t>Used only the ARM 32-bit instruction set.</a:t>
                       </a:r>
                     </a:p>
                   </a:txBody>
@@ -6114,7 +6114,18 @@
                           <a:ea typeface="+mn-ea"/>
                           <a:cs typeface="+mn-cs"/>
                         </a:rPr>
-                        <a:t>Added Thumb 16-bit instruction </a:t>
+                        <a:t>Added </a:t>
+                      </a:r>
+                      <a:r>
+                        <a:rPr lang="en-US" sz="1200" b="1" i="0" u="none" strike="noStrike" kern="1200" baseline="0" dirty="0">
+                          <a:solidFill>
+                            <a:schemeClr val="accent2"/>
+                          </a:solidFill>
+                          <a:latin typeface="Corbel" panose="020B0503020204020204" pitchFamily="34" charset="0"/>
+                          <a:ea typeface="+mn-ea"/>
+                          <a:cs typeface="+mn-cs"/>
+                        </a:rPr>
+                        <a:t>Thumb 16-bit instruction </a:t>
                       </a:r>
                     </a:p>
                     <a:p>
@@ -6185,7 +6196,40 @@
                           <a:ea typeface="+mn-ea"/>
                           <a:cs typeface="+mn-cs"/>
                         </a:rPr>
-                        <a:t>Added improvements for DSP-type operations,</a:t>
+                        <a:t>Added </a:t>
+                      </a:r>
+                      <a:r>
+                        <a:rPr lang="en-US" sz="1200" b="1" i="0" u="none" strike="noStrike" kern="1200" baseline="0" dirty="0">
+                          <a:solidFill>
+                            <a:schemeClr val="accent2"/>
+                          </a:solidFill>
+                          <a:latin typeface="Corbel" panose="020B0503020204020204" pitchFamily="34" charset="0"/>
+                          <a:ea typeface="+mn-ea"/>
+                          <a:cs typeface="+mn-cs"/>
+                        </a:rPr>
+                        <a:t>improvements for DSP-type</a:t>
+                      </a:r>
+                      <a:r>
+                        <a:rPr lang="en-US" sz="1200" b="0" i="0" u="none" strike="noStrike" kern="1200" baseline="0" dirty="0">
+                          <a:solidFill>
+                            <a:schemeClr val="accent2"/>
+                          </a:solidFill>
+                          <a:latin typeface="Corbel" panose="020B0503020204020204" pitchFamily="34" charset="0"/>
+                          <a:ea typeface="+mn-ea"/>
+                          <a:cs typeface="+mn-cs"/>
+                        </a:rPr>
+                        <a:t> </a:t>
+                      </a:r>
+                      <a:r>
+                        <a:rPr lang="en-US" sz="1200" b="0" i="0" u="none" strike="noStrike" kern="1200" baseline="0" dirty="0">
+                          <a:solidFill>
+                            <a:schemeClr val="dk1"/>
+                          </a:solidFill>
+                          <a:latin typeface="Corbel" panose="020B0503020204020204" pitchFamily="34" charset="0"/>
+                          <a:ea typeface="+mn-ea"/>
+                          <a:cs typeface="+mn-cs"/>
+                        </a:rPr>
+                        <a:t>operations,</a:t>
                       </a:r>
                     </a:p>
                     <a:p>
@@ -6252,7 +6296,18 @@
                           <a:ea typeface="+mn-ea"/>
                           <a:cs typeface="+mn-cs"/>
                         </a:rPr>
-                        <a:t>Support for unaligned memory accesses</a:t>
+                        <a:t>Support for </a:t>
+                      </a:r>
+                      <a:r>
+                        <a:rPr lang="en-US" sz="1200" b="1" i="0" u="none" strike="noStrike" kern="1200" baseline="0" dirty="0">
+                          <a:solidFill>
+                            <a:schemeClr val="accent2"/>
+                          </a:solidFill>
+                          <a:latin typeface="Corbel" panose="020B0503020204020204" pitchFamily="34" charset="0"/>
+                          <a:ea typeface="+mn-ea"/>
+                          <a:cs typeface="+mn-cs"/>
+                        </a:rPr>
+                        <a:t>unaligned memory accesses</a:t>
                       </a:r>
                     </a:p>
                     <a:p>
@@ -6278,6 +6333,28 @@
                         <a:buChar char="•"/>
                       </a:pPr>
                       <a:r>
+                        <a:rPr lang="en-US" sz="1200" b="1" i="0" u="none" strike="noStrike" kern="1200" baseline="0" dirty="0">
+                          <a:solidFill>
+                            <a:schemeClr val="accent2"/>
+                          </a:solidFill>
+                          <a:latin typeface="Corbel" panose="020B0503020204020204" pitchFamily="34" charset="0"/>
+                          <a:ea typeface="+mn-ea"/>
+                          <a:cs typeface="+mn-cs"/>
+                        </a:rPr>
+                        <a:t>Multi-processor support</a:t>
+                      </a:r>
+                      <a:r>
+                        <a:rPr lang="en-US" sz="1200" b="1" i="0" u="none" strike="noStrike" kern="1200" baseline="0" dirty="0">
+                          <a:solidFill>
+                            <a:schemeClr val="dk1"/>
+                          </a:solidFill>
+                          <a:latin typeface="Corbel" panose="020B0503020204020204" pitchFamily="34" charset="0"/>
+                          <a:ea typeface="+mn-ea"/>
+                          <a:cs typeface="+mn-cs"/>
+                        </a:rPr>
+                        <a:t>.</a:t>
+                      </a:r>
+                      <a:r>
                         <a:rPr lang="en-US" sz="1200" b="0" i="0" u="none" strike="noStrike" kern="1200" baseline="0" dirty="0">
                           <a:solidFill>
                             <a:schemeClr val="dk1"/>
@@ -6286,7 +6363,7 @@
                           <a:ea typeface="+mn-ea"/>
                           <a:cs typeface="+mn-cs"/>
                         </a:rPr>
-                        <a:t>Multi-processor support. (e.g. ARM1136JF-S®)</a:t>
+                        <a:t> (e.g. ARM1136JF-S®)</a:t>
                       </a:r>
                     </a:p>
                     <a:p>
@@ -6365,6 +6442,17 @@
                         <a:buChar char="•"/>
                       </a:pPr>
                       <a:r>
+                        <a:rPr lang="en-US" sz="1200" b="1" i="0" u="none" strike="noStrike" kern="1200" baseline="0" dirty="0">
+                          <a:solidFill>
+                            <a:schemeClr val="accent2"/>
+                          </a:solidFill>
+                          <a:latin typeface="Corbel" panose="020B0503020204020204" pitchFamily="34" charset="0"/>
+                          <a:ea typeface="+mn-ea"/>
+                          <a:cs typeface="+mn-cs"/>
+                        </a:rPr>
+                        <a:t>Thumb-2 </a:t>
+                      </a:r>
+                      <a:r>
                         <a:rPr lang="en-US" sz="1200" b="0" i="0" u="none" strike="noStrike" kern="1200" baseline="0" dirty="0">
                           <a:solidFill>
                             <a:schemeClr val="dk1"/>
@@ -6373,7 +6461,7 @@
                           <a:ea typeface="+mn-ea"/>
                           <a:cs typeface="+mn-cs"/>
                         </a:rPr>
-                        <a:t>Thumb-2 extends Thumb to be a mixed length 16-bit and 32-bit instruction set.</a:t>
+                        <a:t>extends Thumb to be a mixed length 16-bit and 32-bit instruction set.</a:t>
                       </a:r>
                     </a:p>
                   </a:txBody>
@@ -6400,7 +6488,7 @@
                           <a:ea typeface="+mn-ea"/>
                           <a:cs typeface="+mn-cs"/>
                         </a:rPr>
-                        <a:t>ARMv7-A</a:t>
+                        <a:t>ARMv7</a:t>
                       </a:r>
                       <a:endParaRPr lang="en-US" sz="1400" dirty="0">
                         <a:latin typeface="Corbel" panose="020B0503020204020204" pitchFamily="34" charset="0"/>
@@ -6440,7 +6528,18 @@
                           <a:ea typeface="+mn-ea"/>
                           <a:cs typeface="+mn-cs"/>
                         </a:rPr>
-                        <a:t>ARMv7-A makes Thumb-2 extensions mandatory</a:t>
+                        <a:t>ARMv7-A makes </a:t>
+                      </a:r>
+                      <a:r>
+                        <a:rPr lang="en-US" sz="1200" b="1" i="0" u="none" strike="noStrike" kern="1200" baseline="0" dirty="0">
+                          <a:solidFill>
+                            <a:schemeClr val="accent2"/>
+                          </a:solidFill>
+                          <a:latin typeface="Corbel" panose="020B0503020204020204" pitchFamily="34" charset="0"/>
+                          <a:ea typeface="+mn-ea"/>
+                          <a:cs typeface="+mn-cs"/>
+                        </a:rPr>
+                        <a:t>Thumb-2 extensions mandatory</a:t>
                       </a:r>
                     </a:p>
                     <a:p>
@@ -6483,22 +6582,16 @@
                         <a:buChar char="•"/>
                       </a:pPr>
                       <a:r>
-                        <a:rPr lang="en-US" sz="1200" b="0" i="0" u="none" strike="noStrike" kern="1200" baseline="0" dirty="0">
+                        <a:rPr lang="en-US" sz="1200" b="1" i="0" u="none" strike="noStrike" kern="1200" baseline="0" dirty="0">
                           <a:solidFill>
-                            <a:schemeClr val="dk1"/>
+                            <a:schemeClr val="accent2"/>
                           </a:solidFill>
                           <a:latin typeface="Corbel" panose="020B0503020204020204" pitchFamily="34" charset="0"/>
                           <a:ea typeface="+mn-ea"/>
                           <a:cs typeface="+mn-cs"/>
                         </a:rPr>
-                        <a:t>ARMv7-A provides all the features necessary to support a platform Operating System such as Linux.</a:t>
+                        <a:t>ARMv7-A</a:t>
                       </a:r>
-                    </a:p>
-                    <a:p>
-                      <a:pPr marL="742950" lvl="1" indent="-285750">
-                        <a:buFont typeface="Arial" panose="020B0604020202020204" pitchFamily="34" charset="0"/>
-                        <a:buChar char="•"/>
-                      </a:pPr>
                       <a:r>
                         <a:rPr lang="en-US" sz="1200" b="0" i="0" u="none" strike="noStrike" kern="1200" baseline="0" dirty="0">
                           <a:solidFill>
@@ -6508,7 +6601,7 @@
                           <a:ea typeface="+mn-ea"/>
                           <a:cs typeface="+mn-cs"/>
                         </a:rPr>
-                        <a:t>ARMv7-R provides predictable real-time high-performance.</a:t>
+                        <a:t> provides all the features necessary to support a platform Operating System such as Linux.</a:t>
                       </a:r>
                     </a:p>
                     <a:p>
@@ -6516,6 +6609,28 @@
                         <a:buFont typeface="Arial" panose="020B0604020202020204" pitchFamily="34" charset="0"/>
                         <a:buChar char="•"/>
                       </a:pPr>
+                      <a:r>
+                        <a:rPr lang="en-US" sz="1200" b="1" i="0" u="none" strike="noStrike" kern="1200" baseline="0" dirty="0">
+                          <a:solidFill>
+                            <a:schemeClr val="accent2"/>
+                          </a:solidFill>
+                          <a:latin typeface="Corbel" panose="020B0503020204020204" pitchFamily="34" charset="0"/>
+                          <a:ea typeface="+mn-ea"/>
+                          <a:cs typeface="+mn-cs"/>
+                        </a:rPr>
+                        <a:t>ARMv7-R</a:t>
+                      </a:r>
+                      <a:r>
+                        <a:rPr lang="en-US" sz="1200" b="0" i="0" u="none" strike="noStrike" kern="1200" baseline="0" dirty="0">
+                          <a:solidFill>
+                            <a:schemeClr val="accent2"/>
+                          </a:solidFill>
+                          <a:latin typeface="Corbel" panose="020B0503020204020204" pitchFamily="34" charset="0"/>
+                          <a:ea typeface="+mn-ea"/>
+                          <a:cs typeface="+mn-cs"/>
+                        </a:rPr>
+                        <a:t> </a:t>
+                      </a:r>
                       <a:r>
                         <a:rPr lang="en-US" sz="1200" b="0" i="0" u="none" strike="noStrike" kern="1200" baseline="0" dirty="0">
                           <a:solidFill>
@@ -6525,7 +6640,35 @@
                           <a:ea typeface="+mn-ea"/>
                           <a:cs typeface="+mn-cs"/>
                         </a:rPr>
-                        <a:t>ARMv7-M is targeted at deeply-embedded microcontrollers.</a:t>
+                        <a:t>provides predictable real-time high-performance.</a:t>
+                      </a:r>
+                    </a:p>
+                    <a:p>
+                      <a:pPr marL="742950" lvl="1" indent="-285750">
+                        <a:buFont typeface="Arial" panose="020B0604020202020204" pitchFamily="34" charset="0"/>
+                        <a:buChar char="•"/>
+                      </a:pPr>
+                      <a:r>
+                        <a:rPr lang="en-US" sz="1200" b="1" i="0" u="none" strike="noStrike" kern="1200" baseline="0" dirty="0">
+                          <a:solidFill>
+                            <a:schemeClr val="accent2"/>
+                          </a:solidFill>
+                          <a:latin typeface="Corbel" panose="020B0503020204020204" pitchFamily="34" charset="0"/>
+                          <a:ea typeface="+mn-ea"/>
+                          <a:cs typeface="+mn-cs"/>
+                        </a:rPr>
+                        <a:t>ARMv7-M</a:t>
+                      </a:r>
+                      <a:r>
+                        <a:rPr lang="en-US" sz="1200" b="0" i="0" u="none" strike="noStrike" kern="1200" baseline="0" dirty="0">
+                          <a:solidFill>
+                            <a:schemeClr val="dk1"/>
+                          </a:solidFill>
+                          <a:latin typeface="Corbel" panose="020B0503020204020204" pitchFamily="34" charset="0"/>
+                          <a:ea typeface="+mn-ea"/>
+                          <a:cs typeface="+mn-cs"/>
+                        </a:rPr>
+                        <a:t> is targeted at deeply-embedded microcontrollers.</a:t>
                       </a:r>
                     </a:p>
                   </a:txBody>
@@ -6611,13 +6754,13 @@
           <p:nvPr>
             <p:extLst>
               <p:ext uri="{D42A27DB-BD31-4B8C-83A1-F6EECF244321}">
-                <p14:modId xmlns:p14="http://schemas.microsoft.com/office/powerpoint/2010/main" val="1585320651"/>
+                <p14:modId xmlns:p14="http://schemas.microsoft.com/office/powerpoint/2010/main" val="4014347954"/>
               </p:ext>
             </p:extLst>
           </p:nvPr>
         </p:nvGraphicFramePr>
         <p:xfrm>
-          <a:off x="265286" y="1371628"/>
+          <a:off x="433181" y="1107852"/>
           <a:ext cx="8674808" cy="986369"/>
         </p:xfrm>
         <a:graphic>
@@ -6717,7 +6860,29 @@
                           <a:ea typeface="+mn-ea"/>
                           <a:cs typeface="+mn-cs"/>
                         </a:rPr>
-                        <a:t>Includes both 32-bit execution and 64-bit execution. </a:t>
+                        <a:t>Includes </a:t>
+                      </a:r>
+                      <a:r>
+                        <a:rPr lang="en-US" sz="1200" b="1" i="0" u="none" strike="noStrike" kern="1200" baseline="0" dirty="0">
+                          <a:solidFill>
+                            <a:schemeClr val="accent2"/>
+                          </a:solidFill>
+                          <a:latin typeface="Corbel" panose="020B0503020204020204" pitchFamily="34" charset="0"/>
+                          <a:ea typeface="+mn-ea"/>
+                          <a:cs typeface="+mn-cs"/>
+                        </a:rPr>
+                        <a:t>both 32-bit execution and 64-bit execution</a:t>
+                      </a:r>
+                      <a:r>
+                        <a:rPr lang="en-US" sz="1200" b="0" i="0" u="none" strike="noStrike" kern="1200" baseline="0" dirty="0">
+                          <a:solidFill>
+                            <a:schemeClr val="dk1"/>
+                          </a:solidFill>
+                          <a:latin typeface="Corbel" panose="020B0503020204020204" pitchFamily="34" charset="0"/>
+                          <a:ea typeface="+mn-ea"/>
+                          <a:cs typeface="+mn-cs"/>
+                        </a:rPr>
+                        <a:t>. </a:t>
                       </a:r>
                     </a:p>
                     <a:p>
@@ -6766,7 +6931,7 @@
         </p:blipFill>
         <p:spPr>
           <a:xfrm>
-            <a:off x="265286" y="2516245"/>
+            <a:off x="433181" y="2862474"/>
             <a:ext cx="5372663" cy="3256662"/>
           </a:xfrm>
           <a:prstGeom prst="rect">
@@ -6782,7 +6947,7 @@
         </p:nvSpPr>
         <p:spPr>
           <a:xfrm>
-            <a:off x="6693659" y="2584938"/>
+            <a:off x="6352465" y="2612233"/>
             <a:ext cx="4492869" cy="4000500"/>
           </a:xfrm>
           <a:prstGeom prst="roundRect">

</xml_diff>